<commit_message>
Updated with notes from meeting
</commit_message>
<xml_diff>
--- a/youtube simulation/Current Status of YouTube Simulation - 1-9-24.pptx
+++ b/youtube simulation/Current Status of YouTube Simulation - 1-9-24.pptx
@@ -6224,6 +6224,67 @@
           </a:prstGeom>
         </p:spPr>
       </p:pic>
+      <p:sp>
+        <p:nvSpPr>
+          <p:cNvPr id="3" name="TextBox 2">
+            <a:extLst>
+              <a:ext uri="{FF2B5EF4-FFF2-40B4-BE49-F238E27FC236}">
+                <a16:creationId xmlns:a16="http://schemas.microsoft.com/office/drawing/2014/main" id="{4DB91A74-EA52-217F-67B8-68BE53EF99A1}"/>
+              </a:ext>
+            </a:extLst>
+          </p:cNvPr>
+          <p:cNvSpPr txBox="1"/>
+          <p:nvPr/>
+        </p:nvSpPr>
+        <p:spPr>
+          <a:xfrm>
+            <a:off x="146695" y="1152698"/>
+            <a:ext cx="2438400" cy="5078313"/>
+          </a:xfrm>
+          <a:prstGeom prst="rect">
+            <a:avLst/>
+          </a:prstGeom>
+          <a:noFill/>
+        </p:spPr>
+        <p:txBody>
+          <a:bodyPr wrap="square" rtlCol="0">
+            <a:spAutoFit/>
+          </a:bodyPr>
+          <a:lstStyle/>
+          <a:p>
+            <a:r>
+              <a:rPr lang="en-US" dirty="0"/>
+              <a:t>Make y axis extremeness of videos watched</a:t>
+            </a:r>
+          </a:p>
+          <a:p>
+            <a:r>
+              <a:rPr lang="en-US" dirty="0"/>
+              <a:t>Make x axis the longest video threshold, or </a:t>
+            </a:r>
+            <a:r>
+              <a:rPr lang="en-US" dirty="0" err="1"/>
+              <a:t>yt</a:t>
+            </a:r>
+            <a:r>
+              <a:rPr lang="en-US" dirty="0"/>
+              <a:t> time threshold, or pop threshold</a:t>
+            </a:r>
+          </a:p>
+          <a:p>
+            <a:r>
+              <a:rPr lang="en-US" dirty="0"/>
+              <a:t>- &gt; each of the other parameters, one graph at a time</a:t>
+            </a:r>
+          </a:p>
+          <a:p>
+            <a:r>
+              <a:rPr lang="en-US" dirty="0"/>
+              <a:t>If you’re switching to generate random, non-archetype agents, sort the agents by extremeness on x-axis and see what their watched extremeness is on y-axis. Etc. </a:t>
+            </a:r>
+          </a:p>
+        </p:txBody>
+      </p:sp>
     </p:spTree>
     <p:extLst>
       <p:ext uri="{BB962C8B-B14F-4D97-AF65-F5344CB8AC3E}">
@@ -6642,11 +6703,13 @@
         <p:spPr>
           <a:xfrm>
             <a:off x="657224" y="2208723"/>
-            <a:ext cx="9104654" cy="3767328"/>
-          </a:xfrm>
-        </p:spPr>
-        <p:txBody>
-          <a:bodyPr/>
+            <a:ext cx="10986136" cy="4219786"/>
+          </a:xfrm>
+        </p:spPr>
+        <p:txBody>
+          <a:bodyPr>
+            <a:normAutofit lnSpcReduction="10000"/>
+          </a:bodyPr>
           <a:lstStyle/>
           <a:p>
             <a:pPr>
@@ -6679,13 +6742,23 @@
             </a:r>
           </a:p>
           <a:p>
+            <a:pPr lvl="1">
+              <a:buFont typeface="Arial" panose="020B0604020202020204" pitchFamily="34" charset="0"/>
+              <a:buChar char="•"/>
+            </a:pPr>
+            <a:r>
+              <a:rPr lang="en-US" dirty="0"/>
+              <a:t>E.g. how do the results of the scoring system change depending on how the parameters change?</a:t>
+            </a:r>
+          </a:p>
+          <a:p>
             <a:pPr>
               <a:buFont typeface="Arial" panose="020B0604020202020204" pitchFamily="34" charset="0"/>
               <a:buChar char="•"/>
             </a:pPr>
             <a:r>
               <a:rPr lang="en-US" dirty="0"/>
-              <a:t>Try making the agents a lot more random</a:t>
+              <a:t> Try making the agents a lot more random</a:t>
             </a:r>
           </a:p>
           <a:p>
@@ -6696,6 +6769,23 @@
             <a:r>
               <a:rPr lang="en-US" dirty="0"/>
               <a:t>e.g. Generate however many agents, but instead of following a distribution for their viewing preferences and habits, all of their attributes are completely random. Disregard the archetypes entirely.</a:t>
+            </a:r>
+          </a:p>
+          <a:p>
+            <a:pPr lvl="1">
+              <a:buFont typeface="Arial" panose="020B0604020202020204" pitchFamily="34" charset="0"/>
+              <a:buChar char="•"/>
+            </a:pPr>
+            <a:endParaRPr lang="en-US" dirty="0"/>
+          </a:p>
+          <a:p>
+            <a:pPr lvl="1">
+              <a:buFont typeface="Arial" panose="020B0604020202020204" pitchFamily="34" charset="0"/>
+              <a:buChar char="•"/>
+            </a:pPr>
+            <a:r>
+              <a:rPr lang="en-US" dirty="0"/>
+              <a:t>What would a normal person want to know from this work? What questions are we missing here?</a:t>
             </a:r>
           </a:p>
         </p:txBody>

</xml_diff>

<commit_message>
Poking around the scoring system
</commit_message>
<xml_diff>
--- a/youtube simulation/Current Status of YouTube Simulation - 1-9-24.pptx
+++ b/youtube simulation/Current Status of YouTube Simulation - 1-9-24.pptx
@@ -340,7 +340,7 @@
           <a:p>
             <a:fld id="{C62310E3-9A57-4749-BE71-4D6AEC267A5D}" type="datetimeFigureOut">
               <a:rPr lang="en-US" smtClean="0"/>
-              <a:t>1/23/2024</a:t>
+              <a:t>1/28/2024</a:t>
             </a:fld>
             <a:endParaRPr lang="en-US"/>
           </a:p>
@@ -530,7 +530,7 @@
           <a:p>
             <a:fld id="{C62310E3-9A57-4749-BE71-4D6AEC267A5D}" type="datetimeFigureOut">
               <a:rPr lang="en-US" smtClean="0"/>
-              <a:t>1/23/2024</a:t>
+              <a:t>1/28/2024</a:t>
             </a:fld>
             <a:endParaRPr lang="en-US"/>
           </a:p>
@@ -710,7 +710,7 @@
           <a:p>
             <a:fld id="{C62310E3-9A57-4749-BE71-4D6AEC267A5D}" type="datetimeFigureOut">
               <a:rPr lang="en-US" smtClean="0"/>
-              <a:t>1/23/2024</a:t>
+              <a:t>1/28/2024</a:t>
             </a:fld>
             <a:endParaRPr lang="en-US"/>
           </a:p>
@@ -879,7 +879,7 @@
           <a:p>
             <a:fld id="{C62310E3-9A57-4749-BE71-4D6AEC267A5D}" type="datetimeFigureOut">
               <a:rPr lang="en-US" smtClean="0"/>
-              <a:t>1/23/2024</a:t>
+              <a:t>1/28/2024</a:t>
             </a:fld>
             <a:endParaRPr lang="en-US"/>
           </a:p>
@@ -1135,7 +1135,7 @@
           <a:p>
             <a:fld id="{C62310E3-9A57-4749-BE71-4D6AEC267A5D}" type="datetimeFigureOut">
               <a:rPr lang="en-US" smtClean="0"/>
-              <a:t>1/23/2024</a:t>
+              <a:t>1/28/2024</a:t>
             </a:fld>
             <a:endParaRPr lang="en-US"/>
           </a:p>
@@ -1423,7 +1423,7 @@
           <a:p>
             <a:fld id="{C62310E3-9A57-4749-BE71-4D6AEC267A5D}" type="datetimeFigureOut">
               <a:rPr lang="en-US" smtClean="0"/>
-              <a:t>1/23/2024</a:t>
+              <a:t>1/28/2024</a:t>
             </a:fld>
             <a:endParaRPr lang="en-US"/>
           </a:p>
@@ -1861,7 +1861,7 @@
           <a:p>
             <a:fld id="{C62310E3-9A57-4749-BE71-4D6AEC267A5D}" type="datetimeFigureOut">
               <a:rPr lang="en-US" smtClean="0"/>
-              <a:t>1/23/2024</a:t>
+              <a:t>1/28/2024</a:t>
             </a:fld>
             <a:endParaRPr lang="en-US"/>
           </a:p>
@@ -1979,7 +1979,7 @@
           <a:p>
             <a:fld id="{C62310E3-9A57-4749-BE71-4D6AEC267A5D}" type="datetimeFigureOut">
               <a:rPr lang="en-US" smtClean="0"/>
-              <a:t>1/23/2024</a:t>
+              <a:t>1/28/2024</a:t>
             </a:fld>
             <a:endParaRPr lang="en-US"/>
           </a:p>
@@ -2074,7 +2074,7 @@
           <a:p>
             <a:fld id="{C62310E3-9A57-4749-BE71-4D6AEC267A5D}" type="datetimeFigureOut">
               <a:rPr lang="en-US" smtClean="0"/>
-              <a:t>1/23/2024</a:t>
+              <a:t>1/28/2024</a:t>
             </a:fld>
             <a:endParaRPr lang="en-US"/>
           </a:p>
@@ -2430,7 +2430,7 @@
           <a:p>
             <a:fld id="{C62310E3-9A57-4749-BE71-4D6AEC267A5D}" type="datetimeFigureOut">
               <a:rPr lang="en-US" smtClean="0"/>
-              <a:t>1/23/2024</a:t>
+              <a:t>1/28/2024</a:t>
             </a:fld>
             <a:endParaRPr lang="en-US"/>
           </a:p>
@@ -2746,7 +2746,7 @@
           <a:p>
             <a:fld id="{C62310E3-9A57-4749-BE71-4D6AEC267A5D}" type="datetimeFigureOut">
               <a:rPr lang="en-US" smtClean="0"/>
-              <a:t>1/23/2024</a:t>
+              <a:t>1/28/2024</a:t>
             </a:fld>
             <a:endParaRPr lang="en-US"/>
           </a:p>
@@ -2979,7 +2979,7 @@
           <a:p>
             <a:fld id="{C62310E3-9A57-4749-BE71-4D6AEC267A5D}" type="datetimeFigureOut">
               <a:rPr lang="en-US" smtClean="0"/>
-              <a:t>1/23/2024</a:t>
+              <a:t>1/28/2024</a:t>
             </a:fld>
             <a:endParaRPr lang="en-US"/>
           </a:p>
@@ -6495,6 +6495,417 @@
           </a:p>
         </p:txBody>
       </p:sp>
+      <p:sp>
+        <p:nvSpPr>
+          <p:cNvPr id="2" name="TextBox 1">
+            <a:extLst>
+              <a:ext uri="{FF2B5EF4-FFF2-40B4-BE49-F238E27FC236}">
+                <a16:creationId xmlns:a16="http://schemas.microsoft.com/office/drawing/2014/main" id="{5DD5F7B6-54D5-5131-9F50-622E2C981AEC}"/>
+              </a:ext>
+            </a:extLst>
+          </p:cNvPr>
+          <p:cNvSpPr txBox="1"/>
+          <p:nvPr/>
+        </p:nvSpPr>
+        <p:spPr>
+          <a:xfrm>
+            <a:off x="5370021" y="119786"/>
+            <a:ext cx="6350923" cy="1754326"/>
+          </a:xfrm>
+          <a:prstGeom prst="rect">
+            <a:avLst/>
+          </a:prstGeom>
+          <a:noFill/>
+        </p:spPr>
+        <p:txBody>
+          <a:bodyPr wrap="square" rtlCol="0">
+            <a:spAutoFit/>
+          </a:bodyPr>
+          <a:lstStyle/>
+          <a:p>
+            <a:r>
+              <a:rPr lang="en-US" b="1" i="1" dirty="0"/>
+              <a:t>Why the horizontal lines? Why no trend on the left?</a:t>
+            </a:r>
+          </a:p>
+          <a:p>
+            <a:r>
+              <a:rPr lang="en-US" dirty="0"/>
+              <a:t>I think it’s because in the scoring, the first large amount of videos all have the same extremeness, and video extremeness-es are NOT random floats. Rather, they’re all picked from </a:t>
+            </a:r>
+            <a:r>
+              <a:rPr lang="en-US" b="0" dirty="0">
+                <a:solidFill>
+                  <a:srgbClr val="ADB8B8"/>
+                </a:solidFill>
+                <a:effectLst/>
+                <a:latin typeface="Consolas" panose="020B0609020204030204" pitchFamily="49" charset="0"/>
+              </a:rPr>
+              <a:t>[</a:t>
+            </a:r>
+            <a:r>
+              <a:rPr lang="en-US" b="0" dirty="0">
+                <a:solidFill>
+                  <a:srgbClr val="C9D479"/>
+                </a:solidFill>
+                <a:effectLst/>
+                <a:latin typeface="Consolas" panose="020B0609020204030204" pitchFamily="49" charset="0"/>
+              </a:rPr>
+              <a:t>0.0</a:t>
+            </a:r>
+            <a:r>
+              <a:rPr lang="en-US" b="0" dirty="0">
+                <a:solidFill>
+                  <a:srgbClr val="ADB8B8"/>
+                </a:solidFill>
+                <a:effectLst/>
+                <a:latin typeface="Consolas" panose="020B0609020204030204" pitchFamily="49" charset="0"/>
+              </a:rPr>
+              <a:t>,</a:t>
+            </a:r>
+            <a:r>
+              <a:rPr lang="en-US" b="0" dirty="0">
+                <a:solidFill>
+                  <a:srgbClr val="DDDCD3"/>
+                </a:solidFill>
+                <a:effectLst/>
+                <a:latin typeface="Consolas" panose="020B0609020204030204" pitchFamily="49" charset="0"/>
+              </a:rPr>
+              <a:t> </a:t>
+            </a:r>
+            <a:r>
+              <a:rPr lang="en-US" b="0" dirty="0">
+                <a:solidFill>
+                  <a:srgbClr val="C9D479"/>
+                </a:solidFill>
+                <a:effectLst/>
+                <a:latin typeface="Consolas" panose="020B0609020204030204" pitchFamily="49" charset="0"/>
+              </a:rPr>
+              <a:t>0.1</a:t>
+            </a:r>
+            <a:r>
+              <a:rPr lang="en-US" b="0" dirty="0">
+                <a:solidFill>
+                  <a:srgbClr val="ADB8B8"/>
+                </a:solidFill>
+                <a:effectLst/>
+                <a:latin typeface="Consolas" panose="020B0609020204030204" pitchFamily="49" charset="0"/>
+              </a:rPr>
+              <a:t>,</a:t>
+            </a:r>
+            <a:r>
+              <a:rPr lang="en-US" b="0" dirty="0">
+                <a:solidFill>
+                  <a:srgbClr val="DDDCD3"/>
+                </a:solidFill>
+                <a:effectLst/>
+                <a:latin typeface="Consolas" panose="020B0609020204030204" pitchFamily="49" charset="0"/>
+              </a:rPr>
+              <a:t> </a:t>
+            </a:r>
+            <a:r>
+              <a:rPr lang="en-US" b="0" dirty="0">
+                <a:solidFill>
+                  <a:srgbClr val="C9D479"/>
+                </a:solidFill>
+                <a:effectLst/>
+                <a:latin typeface="Consolas" panose="020B0609020204030204" pitchFamily="49" charset="0"/>
+              </a:rPr>
+              <a:t>0.2</a:t>
+            </a:r>
+            <a:r>
+              <a:rPr lang="en-US" b="0" dirty="0">
+                <a:solidFill>
+                  <a:srgbClr val="ADB8B8"/>
+                </a:solidFill>
+                <a:effectLst/>
+                <a:latin typeface="Consolas" panose="020B0609020204030204" pitchFamily="49" charset="0"/>
+              </a:rPr>
+              <a:t>,</a:t>
+            </a:r>
+            <a:r>
+              <a:rPr lang="en-US" b="0" dirty="0">
+                <a:solidFill>
+                  <a:srgbClr val="DDDCD3"/>
+                </a:solidFill>
+                <a:effectLst/>
+                <a:latin typeface="Consolas" panose="020B0609020204030204" pitchFamily="49" charset="0"/>
+              </a:rPr>
+              <a:t> </a:t>
+            </a:r>
+            <a:r>
+              <a:rPr lang="en-US" b="0" dirty="0">
+                <a:solidFill>
+                  <a:srgbClr val="C9D479"/>
+                </a:solidFill>
+                <a:effectLst/>
+                <a:latin typeface="Consolas" panose="020B0609020204030204" pitchFamily="49" charset="0"/>
+              </a:rPr>
+              <a:t>0.3</a:t>
+            </a:r>
+            <a:r>
+              <a:rPr lang="en-US" b="0" dirty="0">
+                <a:solidFill>
+                  <a:srgbClr val="ADB8B8"/>
+                </a:solidFill>
+                <a:effectLst/>
+                <a:latin typeface="Consolas" panose="020B0609020204030204" pitchFamily="49" charset="0"/>
+              </a:rPr>
+              <a:t>,</a:t>
+            </a:r>
+            <a:r>
+              <a:rPr lang="en-US" b="0" dirty="0">
+                <a:solidFill>
+                  <a:srgbClr val="DDDCD3"/>
+                </a:solidFill>
+                <a:effectLst/>
+                <a:latin typeface="Consolas" panose="020B0609020204030204" pitchFamily="49" charset="0"/>
+              </a:rPr>
+              <a:t> </a:t>
+            </a:r>
+            <a:r>
+              <a:rPr lang="en-US" b="0" dirty="0">
+                <a:solidFill>
+                  <a:srgbClr val="C9D479"/>
+                </a:solidFill>
+                <a:effectLst/>
+                <a:latin typeface="Consolas" panose="020B0609020204030204" pitchFamily="49" charset="0"/>
+              </a:rPr>
+              <a:t>0.4</a:t>
+            </a:r>
+            <a:r>
+              <a:rPr lang="en-US" b="0" dirty="0">
+                <a:solidFill>
+                  <a:srgbClr val="ADB8B8"/>
+                </a:solidFill>
+                <a:effectLst/>
+                <a:latin typeface="Consolas" panose="020B0609020204030204" pitchFamily="49" charset="0"/>
+              </a:rPr>
+              <a:t>,</a:t>
+            </a:r>
+            <a:r>
+              <a:rPr lang="en-US" b="0" dirty="0">
+                <a:solidFill>
+                  <a:srgbClr val="DDDCD3"/>
+                </a:solidFill>
+                <a:effectLst/>
+                <a:latin typeface="Consolas" panose="020B0609020204030204" pitchFamily="49" charset="0"/>
+              </a:rPr>
+              <a:t> </a:t>
+            </a:r>
+            <a:r>
+              <a:rPr lang="en-US" b="0" dirty="0">
+                <a:solidFill>
+                  <a:srgbClr val="C9D479"/>
+                </a:solidFill>
+                <a:effectLst/>
+                <a:latin typeface="Consolas" panose="020B0609020204030204" pitchFamily="49" charset="0"/>
+              </a:rPr>
+              <a:t>0.5</a:t>
+            </a:r>
+            <a:r>
+              <a:rPr lang="en-US" b="0" dirty="0">
+                <a:solidFill>
+                  <a:srgbClr val="ADB8B8"/>
+                </a:solidFill>
+                <a:effectLst/>
+                <a:latin typeface="Consolas" panose="020B0609020204030204" pitchFamily="49" charset="0"/>
+              </a:rPr>
+              <a:t>,</a:t>
+            </a:r>
+            <a:r>
+              <a:rPr lang="en-US" b="0" dirty="0">
+                <a:solidFill>
+                  <a:srgbClr val="DDDCD3"/>
+                </a:solidFill>
+                <a:effectLst/>
+                <a:latin typeface="Consolas" panose="020B0609020204030204" pitchFamily="49" charset="0"/>
+              </a:rPr>
+              <a:t> </a:t>
+            </a:r>
+            <a:r>
+              <a:rPr lang="en-US" b="0" dirty="0">
+                <a:solidFill>
+                  <a:srgbClr val="C9D479"/>
+                </a:solidFill>
+                <a:effectLst/>
+                <a:latin typeface="Consolas" panose="020B0609020204030204" pitchFamily="49" charset="0"/>
+              </a:rPr>
+              <a:t>0.6</a:t>
+            </a:r>
+            <a:r>
+              <a:rPr lang="en-US" b="0" dirty="0">
+                <a:solidFill>
+                  <a:srgbClr val="ADB8B8"/>
+                </a:solidFill>
+                <a:effectLst/>
+                <a:latin typeface="Consolas" panose="020B0609020204030204" pitchFamily="49" charset="0"/>
+              </a:rPr>
+              <a:t>,</a:t>
+            </a:r>
+            <a:r>
+              <a:rPr lang="en-US" b="0" dirty="0">
+                <a:solidFill>
+                  <a:srgbClr val="DDDCD3"/>
+                </a:solidFill>
+                <a:effectLst/>
+                <a:latin typeface="Consolas" panose="020B0609020204030204" pitchFamily="49" charset="0"/>
+              </a:rPr>
+              <a:t> </a:t>
+            </a:r>
+            <a:r>
+              <a:rPr lang="en-US" b="0" dirty="0">
+                <a:solidFill>
+                  <a:srgbClr val="C9D479"/>
+                </a:solidFill>
+                <a:effectLst/>
+                <a:latin typeface="Consolas" panose="020B0609020204030204" pitchFamily="49" charset="0"/>
+              </a:rPr>
+              <a:t>0.7</a:t>
+            </a:r>
+            <a:r>
+              <a:rPr lang="en-US" b="0" dirty="0">
+                <a:solidFill>
+                  <a:srgbClr val="ADB8B8"/>
+                </a:solidFill>
+                <a:effectLst/>
+                <a:latin typeface="Consolas" panose="020B0609020204030204" pitchFamily="49" charset="0"/>
+              </a:rPr>
+              <a:t>,</a:t>
+            </a:r>
+            <a:r>
+              <a:rPr lang="en-US" b="0" dirty="0">
+                <a:solidFill>
+                  <a:srgbClr val="DDDCD3"/>
+                </a:solidFill>
+                <a:effectLst/>
+                <a:latin typeface="Consolas" panose="020B0609020204030204" pitchFamily="49" charset="0"/>
+              </a:rPr>
+              <a:t> </a:t>
+            </a:r>
+            <a:r>
+              <a:rPr lang="en-US" b="0" dirty="0">
+                <a:solidFill>
+                  <a:srgbClr val="C9D479"/>
+                </a:solidFill>
+                <a:effectLst/>
+                <a:latin typeface="Consolas" panose="020B0609020204030204" pitchFamily="49" charset="0"/>
+              </a:rPr>
+              <a:t>0.8</a:t>
+            </a:r>
+            <a:r>
+              <a:rPr lang="en-US" b="0" dirty="0">
+                <a:solidFill>
+                  <a:srgbClr val="ADB8B8"/>
+                </a:solidFill>
+                <a:effectLst/>
+                <a:latin typeface="Consolas" panose="020B0609020204030204" pitchFamily="49" charset="0"/>
+              </a:rPr>
+              <a:t>,</a:t>
+            </a:r>
+            <a:r>
+              <a:rPr lang="en-US" b="0" dirty="0">
+                <a:solidFill>
+                  <a:srgbClr val="DDDCD3"/>
+                </a:solidFill>
+                <a:effectLst/>
+                <a:latin typeface="Consolas" panose="020B0609020204030204" pitchFamily="49" charset="0"/>
+              </a:rPr>
+              <a:t> </a:t>
+            </a:r>
+            <a:r>
+              <a:rPr lang="en-US" b="0" dirty="0">
+                <a:solidFill>
+                  <a:srgbClr val="C9D479"/>
+                </a:solidFill>
+                <a:effectLst/>
+                <a:latin typeface="Consolas" panose="020B0609020204030204" pitchFamily="49" charset="0"/>
+              </a:rPr>
+              <a:t>0.9</a:t>
+            </a:r>
+            <a:r>
+              <a:rPr lang="en-US" b="0" dirty="0">
+                <a:solidFill>
+                  <a:srgbClr val="ADB8B8"/>
+                </a:solidFill>
+                <a:effectLst/>
+                <a:latin typeface="Consolas" panose="020B0609020204030204" pitchFamily="49" charset="0"/>
+              </a:rPr>
+              <a:t>,</a:t>
+            </a:r>
+            <a:r>
+              <a:rPr lang="en-US" b="0" dirty="0">
+                <a:solidFill>
+                  <a:srgbClr val="DDDCD3"/>
+                </a:solidFill>
+                <a:effectLst/>
+                <a:latin typeface="Consolas" panose="020B0609020204030204" pitchFamily="49" charset="0"/>
+              </a:rPr>
+              <a:t> </a:t>
+            </a:r>
+            <a:r>
+              <a:rPr lang="en-US" b="0" dirty="0">
+                <a:solidFill>
+                  <a:srgbClr val="C9D479"/>
+                </a:solidFill>
+                <a:effectLst/>
+                <a:latin typeface="Consolas" panose="020B0609020204030204" pitchFamily="49" charset="0"/>
+              </a:rPr>
+              <a:t>1.0</a:t>
+            </a:r>
+            <a:r>
+              <a:rPr lang="en-US" b="0" dirty="0">
+                <a:solidFill>
+                  <a:srgbClr val="ADB8B8"/>
+                </a:solidFill>
+                <a:effectLst/>
+                <a:latin typeface="Consolas" panose="020B0609020204030204" pitchFamily="49" charset="0"/>
+              </a:rPr>
+              <a:t>]</a:t>
+            </a:r>
+            <a:endParaRPr lang="en-US" b="0" dirty="0">
+              <a:solidFill>
+                <a:srgbClr val="F8F8F2"/>
+              </a:solidFill>
+              <a:effectLst/>
+              <a:latin typeface="Consolas" panose="020B0609020204030204" pitchFamily="49" charset="0"/>
+            </a:endParaRPr>
+          </a:p>
+          <a:p>
+            <a:endParaRPr lang="en-US" dirty="0"/>
+          </a:p>
+        </p:txBody>
+      </p:sp>
+      <p:pic>
+        <p:nvPicPr>
+          <p:cNvPr id="5" name="Picture 4">
+            <a:extLst>
+              <a:ext uri="{FF2B5EF4-FFF2-40B4-BE49-F238E27FC236}">
+                <a16:creationId xmlns:a16="http://schemas.microsoft.com/office/drawing/2014/main" id="{995F32ED-6750-B8CD-13C1-2EB3F3CA1100}"/>
+              </a:ext>
+            </a:extLst>
+          </p:cNvPr>
+          <p:cNvPicPr>
+            <a:picLocks noChangeAspect="1"/>
+          </p:cNvPicPr>
+          <p:nvPr/>
+        </p:nvPicPr>
+        <p:blipFill>
+          <a:blip r:embed="rId4"/>
+          <a:stretch>
+            <a:fillRect/>
+          </a:stretch>
+        </p:blipFill>
+        <p:spPr>
+          <a:xfrm>
+            <a:off x="829455" y="227215"/>
+            <a:ext cx="4179758" cy="2360381"/>
+          </a:xfrm>
+          <a:prstGeom prst="rect">
+            <a:avLst/>
+          </a:prstGeom>
+        </p:spPr>
+      </p:pic>
     </p:spTree>
     <p:extLst>
       <p:ext uri="{BB962C8B-B14F-4D97-AF65-F5344CB8AC3E}">
@@ -6646,6 +7057,45 @@
             <a:r>
               <a:rPr lang="en-US" dirty="0"/>
               <a:t>By Extremeness</a:t>
+            </a:r>
+          </a:p>
+        </p:txBody>
+      </p:sp>
+      <p:sp>
+        <p:nvSpPr>
+          <p:cNvPr id="2" name="TextBox 1">
+            <a:extLst>
+              <a:ext uri="{FF2B5EF4-FFF2-40B4-BE49-F238E27FC236}">
+                <a16:creationId xmlns:a16="http://schemas.microsoft.com/office/drawing/2014/main" id="{FD930C6E-2ECB-8DC3-47E3-B0FA8E1DA991}"/>
+              </a:ext>
+            </a:extLst>
+          </p:cNvPr>
+          <p:cNvSpPr txBox="1"/>
+          <p:nvPr/>
+        </p:nvSpPr>
+        <p:spPr>
+          <a:xfrm>
+            <a:off x="7126779" y="199505"/>
+            <a:ext cx="4909985" cy="2308324"/>
+          </a:xfrm>
+          <a:prstGeom prst="rect">
+            <a:avLst/>
+          </a:prstGeom>
+          <a:noFill/>
+        </p:spPr>
+        <p:txBody>
+          <a:bodyPr wrap="square" rtlCol="0">
+            <a:spAutoFit/>
+          </a:bodyPr>
+          <a:lstStyle/>
+          <a:p>
+            <a:r>
+              <a:rPr lang="en-US" dirty="0"/>
+              <a:t>Why does the average go down? Why is there no stratification on the extremes? i.e. shouldn’t the people on the extremes be watching longer videos, as is their preference? </a:t>
+            </a:r>
+            <a:r>
+              <a:rPr lang="en-US" b="1" i="1" dirty="0"/>
+              <a:t>Or does this preference no longer exist, since it was tied to archetypes (where more extreme watching archetype == longer videos will be watched)? The stratification shows up I believe in the graphs w/ archetypes.</a:t>
             </a:r>
           </a:p>
         </p:txBody>
@@ -15002,7 +15452,7 @@
         <p:spPr>
           <a:xfrm>
             <a:off x="519113" y="4274680"/>
-            <a:ext cx="11152187" cy="1200329"/>
+            <a:ext cx="11152187" cy="3139321"/>
           </a:xfrm>
           <a:prstGeom prst="rect">
             <a:avLst/>
@@ -15032,6 +15482,44 @@
             <a:r>
               <a:rPr lang="en-US" dirty="0"/>
               <a:t>Without archetypes, the average extremeness goes up slightly, the number of videos watched nearly doubles, and the number of minutes watched goes down. The same pattern happens with archetypes.</a:t>
+            </a:r>
+          </a:p>
+          <a:p>
+            <a:pPr marL="285750" indent="-285750">
+              <a:buFont typeface="Arial" panose="020B0604020202020204" pitchFamily="34" charset="0"/>
+              <a:buChar char="•"/>
+            </a:pPr>
+            <a:r>
+              <a:rPr lang="en-US" b="1" dirty="0"/>
+              <a:t>TODO: which is happening---is the simulation perfectly modeling </a:t>
+            </a:r>
+            <a:r>
+              <a:rPr lang="en-US" b="1" dirty="0" err="1"/>
+              <a:t>irl</a:t>
+            </a:r>
+            <a:r>
+              <a:rPr lang="en-US" b="1" dirty="0"/>
+              <a:t>, especially with the decrease in minutes watched? Or are there exclusions and assumptions being made that are leading to this? Figure it out.</a:t>
+            </a:r>
+          </a:p>
+          <a:p>
+            <a:pPr marL="742950" lvl="1" indent="-285750">
+              <a:buFont typeface="Arial" panose="020B0604020202020204" pitchFamily="34" charset="0"/>
+              <a:buChar char="•"/>
+            </a:pPr>
+            <a:r>
+              <a:rPr lang="en-US" b="1" dirty="0"/>
+              <a:t>The model said xyz---should I believe it? Is that part of the model I should change? Or am I learning something new?</a:t>
+            </a:r>
+          </a:p>
+          <a:p>
+            <a:pPr marL="742950" lvl="1" indent="-285750">
+              <a:buFont typeface="Arial" panose="020B0604020202020204" pitchFamily="34" charset="0"/>
+              <a:buChar char="•"/>
+            </a:pPr>
+            <a:r>
+              <a:rPr lang="en-US" i="1" dirty="0"/>
+              <a:t>I tried looking around a bit for the decrease in minutes watched, and maybe it’s modeling something like YouTube Shorts? Where they’re watching more of them, but they’re shorter videos (therefore it’s possible to watch more of them in a smaller amount of time)? Am I reinventing the YouTube Shorts wheel here?</a:t>
             </a:r>
           </a:p>
         </p:txBody>

</xml_diff>

<commit_message>
Updated for 2/12/24 meeting
</commit_message>
<xml_diff>
--- a/youtube simulation/Current Status of YouTube Simulation - 1-9-24.pptx
+++ b/youtube simulation/Current Status of YouTube Simulation - 1-9-24.pptx
@@ -34,6 +34,17 @@
     <p:sldId id="282" r:id="rId28"/>
     <p:sldId id="283" r:id="rId29"/>
     <p:sldId id="284" r:id="rId30"/>
+    <p:sldId id="285" r:id="rId31"/>
+    <p:sldId id="286" r:id="rId32"/>
+    <p:sldId id="287" r:id="rId33"/>
+    <p:sldId id="288" r:id="rId34"/>
+    <p:sldId id="289" r:id="rId35"/>
+    <p:sldId id="290" r:id="rId36"/>
+    <p:sldId id="291" r:id="rId37"/>
+    <p:sldId id="292" r:id="rId38"/>
+    <p:sldId id="293" r:id="rId39"/>
+    <p:sldId id="294" r:id="rId40"/>
+    <p:sldId id="295" r:id="rId41"/>
   </p:sldIdLst>
   <p:sldSz cx="12192000" cy="6858000"/>
   <p:notesSz cx="6858000" cy="9144000"/>
@@ -340,7 +351,7 @@
           <a:p>
             <a:fld id="{C62310E3-9A57-4749-BE71-4D6AEC267A5D}" type="datetimeFigureOut">
               <a:rPr lang="en-US" smtClean="0"/>
-              <a:t>1/28/2024</a:t>
+              <a:t>2/12/2024</a:t>
             </a:fld>
             <a:endParaRPr lang="en-US"/>
           </a:p>
@@ -530,7 +541,7 @@
           <a:p>
             <a:fld id="{C62310E3-9A57-4749-BE71-4D6AEC267A5D}" type="datetimeFigureOut">
               <a:rPr lang="en-US" smtClean="0"/>
-              <a:t>1/28/2024</a:t>
+              <a:t>2/12/2024</a:t>
             </a:fld>
             <a:endParaRPr lang="en-US"/>
           </a:p>
@@ -710,7 +721,7 @@
           <a:p>
             <a:fld id="{C62310E3-9A57-4749-BE71-4D6AEC267A5D}" type="datetimeFigureOut">
               <a:rPr lang="en-US" smtClean="0"/>
-              <a:t>1/28/2024</a:t>
+              <a:t>2/12/2024</a:t>
             </a:fld>
             <a:endParaRPr lang="en-US"/>
           </a:p>
@@ -879,7 +890,7 @@
           <a:p>
             <a:fld id="{C62310E3-9A57-4749-BE71-4D6AEC267A5D}" type="datetimeFigureOut">
               <a:rPr lang="en-US" smtClean="0"/>
-              <a:t>1/28/2024</a:t>
+              <a:t>2/12/2024</a:t>
             </a:fld>
             <a:endParaRPr lang="en-US"/>
           </a:p>
@@ -1135,7 +1146,7 @@
           <a:p>
             <a:fld id="{C62310E3-9A57-4749-BE71-4D6AEC267A5D}" type="datetimeFigureOut">
               <a:rPr lang="en-US" smtClean="0"/>
-              <a:t>1/28/2024</a:t>
+              <a:t>2/12/2024</a:t>
             </a:fld>
             <a:endParaRPr lang="en-US"/>
           </a:p>
@@ -1423,7 +1434,7 @@
           <a:p>
             <a:fld id="{C62310E3-9A57-4749-BE71-4D6AEC267A5D}" type="datetimeFigureOut">
               <a:rPr lang="en-US" smtClean="0"/>
-              <a:t>1/28/2024</a:t>
+              <a:t>2/12/2024</a:t>
             </a:fld>
             <a:endParaRPr lang="en-US"/>
           </a:p>
@@ -1861,7 +1872,7 @@
           <a:p>
             <a:fld id="{C62310E3-9A57-4749-BE71-4D6AEC267A5D}" type="datetimeFigureOut">
               <a:rPr lang="en-US" smtClean="0"/>
-              <a:t>1/28/2024</a:t>
+              <a:t>2/12/2024</a:t>
             </a:fld>
             <a:endParaRPr lang="en-US"/>
           </a:p>
@@ -1979,7 +1990,7 @@
           <a:p>
             <a:fld id="{C62310E3-9A57-4749-BE71-4D6AEC267A5D}" type="datetimeFigureOut">
               <a:rPr lang="en-US" smtClean="0"/>
-              <a:t>1/28/2024</a:t>
+              <a:t>2/12/2024</a:t>
             </a:fld>
             <a:endParaRPr lang="en-US"/>
           </a:p>
@@ -2074,7 +2085,7 @@
           <a:p>
             <a:fld id="{C62310E3-9A57-4749-BE71-4D6AEC267A5D}" type="datetimeFigureOut">
               <a:rPr lang="en-US" smtClean="0"/>
-              <a:t>1/28/2024</a:t>
+              <a:t>2/12/2024</a:t>
             </a:fld>
             <a:endParaRPr lang="en-US"/>
           </a:p>
@@ -2430,7 +2441,7 @@
           <a:p>
             <a:fld id="{C62310E3-9A57-4749-BE71-4D6AEC267A5D}" type="datetimeFigureOut">
               <a:rPr lang="en-US" smtClean="0"/>
-              <a:t>1/28/2024</a:t>
+              <a:t>2/12/2024</a:t>
             </a:fld>
             <a:endParaRPr lang="en-US"/>
           </a:p>
@@ -2746,7 +2757,7 @@
           <a:p>
             <a:fld id="{C62310E3-9A57-4749-BE71-4D6AEC267A5D}" type="datetimeFigureOut">
               <a:rPr lang="en-US" smtClean="0"/>
-              <a:t>1/28/2024</a:t>
+              <a:t>2/12/2024</a:t>
             </a:fld>
             <a:endParaRPr lang="en-US"/>
           </a:p>
@@ -2979,7 +2990,7 @@
           <a:p>
             <a:fld id="{C62310E3-9A57-4749-BE71-4D6AEC267A5D}" type="datetimeFigureOut">
               <a:rPr lang="en-US" smtClean="0"/>
-              <a:t>1/28/2024</a:t>
+              <a:t>2/12/2024</a:t>
             </a:fld>
             <a:endParaRPr lang="en-US"/>
           </a:p>
@@ -6510,7 +6521,7 @@
         <p:spPr>
           <a:xfrm>
             <a:off x="5370021" y="119786"/>
-            <a:ext cx="6350923" cy="1754326"/>
+            <a:ext cx="6350923" cy="7294305"/>
           </a:xfrm>
           <a:prstGeom prst="rect">
             <a:avLst/>
@@ -6862,6 +6873,200 @@
                 <a:latin typeface="Consolas" panose="020B0609020204030204" pitchFamily="49" charset="0"/>
               </a:rPr>
               <a:t>]</a:t>
+            </a:r>
+          </a:p>
+          <a:p>
+            <a:endParaRPr lang="en-US" dirty="0">
+              <a:solidFill>
+                <a:srgbClr val="ADB8B8"/>
+              </a:solidFill>
+              <a:latin typeface="Consolas" panose="020B0609020204030204" pitchFamily="49" charset="0"/>
+            </a:endParaRPr>
+          </a:p>
+          <a:p>
+            <a:endParaRPr lang="en-US" b="0" dirty="0">
+              <a:solidFill>
+                <a:srgbClr val="ADB8B8"/>
+              </a:solidFill>
+              <a:effectLst/>
+              <a:latin typeface="Consolas" panose="020B0609020204030204" pitchFamily="49" charset="0"/>
+            </a:endParaRPr>
+          </a:p>
+          <a:p>
+            <a:endParaRPr lang="en-US" dirty="0">
+              <a:solidFill>
+                <a:srgbClr val="ADB8B8"/>
+              </a:solidFill>
+              <a:latin typeface="Consolas" panose="020B0609020204030204" pitchFamily="49" charset="0"/>
+            </a:endParaRPr>
+          </a:p>
+          <a:p>
+            <a:endParaRPr lang="en-US" b="0" dirty="0">
+              <a:solidFill>
+                <a:srgbClr val="ADB8B8"/>
+              </a:solidFill>
+              <a:effectLst/>
+              <a:latin typeface="Consolas" panose="020B0609020204030204" pitchFamily="49" charset="0"/>
+            </a:endParaRPr>
+          </a:p>
+          <a:p>
+            <a:endParaRPr lang="en-US" dirty="0">
+              <a:solidFill>
+                <a:srgbClr val="ADB8B8"/>
+              </a:solidFill>
+              <a:latin typeface="Consolas" panose="020B0609020204030204" pitchFamily="49" charset="0"/>
+            </a:endParaRPr>
+          </a:p>
+          <a:p>
+            <a:endParaRPr lang="en-US" b="0" dirty="0">
+              <a:solidFill>
+                <a:srgbClr val="ADB8B8"/>
+              </a:solidFill>
+              <a:effectLst/>
+              <a:latin typeface="Consolas" panose="020B0609020204030204" pitchFamily="49" charset="0"/>
+            </a:endParaRPr>
+          </a:p>
+          <a:p>
+            <a:endParaRPr lang="en-US" dirty="0">
+              <a:solidFill>
+                <a:srgbClr val="ADB8B8"/>
+              </a:solidFill>
+              <a:latin typeface="Consolas" panose="020B0609020204030204" pitchFamily="49" charset="0"/>
+            </a:endParaRPr>
+          </a:p>
+          <a:p>
+            <a:endParaRPr lang="en-US" b="0" dirty="0">
+              <a:solidFill>
+                <a:srgbClr val="ADB8B8"/>
+              </a:solidFill>
+              <a:effectLst/>
+              <a:latin typeface="Consolas" panose="020B0609020204030204" pitchFamily="49" charset="0"/>
+            </a:endParaRPr>
+          </a:p>
+          <a:p>
+            <a:endParaRPr lang="en-US" dirty="0">
+              <a:solidFill>
+                <a:srgbClr val="ADB8B8"/>
+              </a:solidFill>
+              <a:latin typeface="Consolas" panose="020B0609020204030204" pitchFamily="49" charset="0"/>
+            </a:endParaRPr>
+          </a:p>
+          <a:p>
+            <a:endParaRPr lang="en-US" b="0" dirty="0">
+              <a:solidFill>
+                <a:srgbClr val="ADB8B8"/>
+              </a:solidFill>
+              <a:effectLst/>
+              <a:latin typeface="Consolas" panose="020B0609020204030204" pitchFamily="49" charset="0"/>
+            </a:endParaRPr>
+          </a:p>
+          <a:p>
+            <a:endParaRPr lang="en-US" dirty="0">
+              <a:solidFill>
+                <a:srgbClr val="ADB8B8"/>
+              </a:solidFill>
+              <a:latin typeface="Consolas" panose="020B0609020204030204" pitchFamily="49" charset="0"/>
+            </a:endParaRPr>
+          </a:p>
+          <a:p>
+            <a:endParaRPr lang="en-US" b="0" dirty="0">
+              <a:solidFill>
+                <a:srgbClr val="ADB8B8"/>
+              </a:solidFill>
+              <a:effectLst/>
+              <a:latin typeface="Consolas" panose="020B0609020204030204" pitchFamily="49" charset="0"/>
+            </a:endParaRPr>
+          </a:p>
+          <a:p>
+            <a:endParaRPr lang="en-US" dirty="0">
+              <a:solidFill>
+                <a:srgbClr val="ADB8B8"/>
+              </a:solidFill>
+              <a:latin typeface="Consolas" panose="020B0609020204030204" pitchFamily="49" charset="0"/>
+            </a:endParaRPr>
+          </a:p>
+          <a:p>
+            <a:endParaRPr lang="en-US" b="0" dirty="0">
+              <a:solidFill>
+                <a:srgbClr val="ADB8B8"/>
+              </a:solidFill>
+              <a:effectLst/>
+              <a:latin typeface="Consolas" panose="020B0609020204030204" pitchFamily="49" charset="0"/>
+            </a:endParaRPr>
+          </a:p>
+          <a:p>
+            <a:endParaRPr lang="en-US" dirty="0">
+              <a:solidFill>
+                <a:srgbClr val="ADB8B8"/>
+              </a:solidFill>
+              <a:latin typeface="Consolas" panose="020B0609020204030204" pitchFamily="49" charset="0"/>
+            </a:endParaRPr>
+          </a:p>
+          <a:p>
+            <a:endParaRPr lang="en-US" b="0" dirty="0">
+              <a:solidFill>
+                <a:srgbClr val="ADB8B8"/>
+              </a:solidFill>
+              <a:effectLst/>
+              <a:latin typeface="Consolas" panose="020B0609020204030204" pitchFamily="49" charset="0"/>
+            </a:endParaRPr>
+          </a:p>
+          <a:p>
+            <a:endParaRPr lang="en-US" dirty="0">
+              <a:solidFill>
+                <a:srgbClr val="ADB8B8"/>
+              </a:solidFill>
+              <a:latin typeface="Consolas" panose="020B0609020204030204" pitchFamily="49" charset="0"/>
+            </a:endParaRPr>
+          </a:p>
+          <a:p>
+            <a:r>
+              <a:rPr lang="en-US" b="0" dirty="0">
+                <a:solidFill>
+                  <a:srgbClr val="ADB8B8"/>
+                </a:solidFill>
+                <a:effectLst/>
+                <a:latin typeface="Consolas" panose="020B0609020204030204" pitchFamily="49" charset="0"/>
+              </a:rPr>
+              <a:t>Maybe relax the strength of extremeness </a:t>
+            </a:r>
+            <a:r>
+              <a:rPr lang="en-US" b="0" dirty="0" err="1">
+                <a:solidFill>
+                  <a:srgbClr val="ADB8B8"/>
+                </a:solidFill>
+                <a:effectLst/>
+                <a:latin typeface="Consolas" panose="020B0609020204030204" pitchFamily="49" charset="0"/>
+              </a:rPr>
+              <a:t>perefence</a:t>
+            </a:r>
+            <a:r>
+              <a:rPr lang="en-US" b="0" dirty="0">
+                <a:solidFill>
+                  <a:srgbClr val="ADB8B8"/>
+                </a:solidFill>
+                <a:effectLst/>
+                <a:latin typeface="Consolas" panose="020B0609020204030204" pitchFamily="49" charset="0"/>
+              </a:rPr>
+              <a:t> in the scoring syste</a:t>
+            </a:r>
+            <a:r>
+              <a:rPr lang="en-US" dirty="0">
+                <a:solidFill>
+                  <a:srgbClr val="ADB8B8"/>
+                </a:solidFill>
+                <a:latin typeface="Consolas" panose="020B0609020204030204" pitchFamily="49" charset="0"/>
+              </a:rPr>
+              <a:t>m so people watch a greater variety of </a:t>
+            </a:r>
+            <a:r>
+              <a:rPr lang="en-US" dirty="0" err="1">
+                <a:solidFill>
+                  <a:srgbClr val="ADB8B8"/>
+                </a:solidFill>
+                <a:latin typeface="Consolas" panose="020B0609020204030204" pitchFamily="49" charset="0"/>
+              </a:rPr>
+              <a:t>extremenesses</a:t>
             </a:r>
             <a:endParaRPr lang="en-US" b="0" dirty="0">
               <a:solidFill>
@@ -15452,7 +15657,7 @@
         <p:spPr>
           <a:xfrm>
             <a:off x="519113" y="4274680"/>
-            <a:ext cx="11152187" cy="3139321"/>
+            <a:ext cx="11152187" cy="4801314"/>
           </a:xfrm>
           <a:prstGeom prst="rect">
             <a:avLst/>
@@ -15520,6 +15725,56 @@
             <a:r>
               <a:rPr lang="en-US" i="1" dirty="0"/>
               <a:t>I tried looking around a bit for the decrease in minutes watched, and maybe it’s modeling something like YouTube Shorts? Where they’re watching more of them, but they’re shorter videos (therefore it’s possible to watch more of them in a smaller amount of time)? Am I reinventing the YouTube Shorts wheel here?</a:t>
+            </a:r>
+          </a:p>
+          <a:p>
+            <a:pPr marL="1200150" lvl="2" indent="-285750">
+              <a:buFont typeface="Arial" panose="020B0604020202020204" pitchFamily="34" charset="0"/>
+              <a:buChar char="•"/>
+            </a:pPr>
+            <a:r>
+              <a:rPr lang="en-US" i="1" dirty="0"/>
+              <a:t>Is there something in the scoring formula that makes people want shorter videos?</a:t>
+            </a:r>
+          </a:p>
+          <a:p>
+            <a:pPr marL="1200150" lvl="2" indent="-285750">
+              <a:buFont typeface="Arial" panose="020B0604020202020204" pitchFamily="34" charset="0"/>
+              <a:buChar char="•"/>
+            </a:pPr>
+            <a:endParaRPr lang="en-US" i="1" dirty="0"/>
+          </a:p>
+          <a:p>
+            <a:pPr marL="1200150" lvl="2" indent="-285750">
+              <a:buFont typeface="Arial" panose="020B0604020202020204" pitchFamily="34" charset="0"/>
+              <a:buChar char="•"/>
+            </a:pPr>
+            <a:endParaRPr lang="en-US" i="1" dirty="0"/>
+          </a:p>
+          <a:p>
+            <a:pPr marL="285750" indent="-285750">
+              <a:buFont typeface="Arial" panose="020B0604020202020204" pitchFamily="34" charset="0"/>
+              <a:buChar char="•"/>
+            </a:pPr>
+            <a:r>
+              <a:rPr lang="en-US" dirty="0"/>
+              <a:t>Be more precise---try to explain what the algorithm does in more precise terms. This outcome happens because the </a:t>
+            </a:r>
+            <a:r>
+              <a:rPr lang="en-US" dirty="0" err="1"/>
+              <a:t>alogirthm</a:t>
+            </a:r>
+            <a:r>
+              <a:rPr lang="en-US" dirty="0"/>
+              <a:t> does xyz mathematical thing that leads to </a:t>
+            </a:r>
+            <a:r>
+              <a:rPr lang="en-US" dirty="0" err="1"/>
+              <a:t>abc</a:t>
+            </a:r>
+            <a:r>
+              <a:rPr lang="en-US" dirty="0"/>
+              <a:t>. As opposed to arguments like “people like to watch shorter videos,” which may be true, but has to be represented in the code if you’re saying that.</a:t>
             </a:r>
           </a:p>
         </p:txBody>
@@ -15633,6 +15888,3276 @@
 </p:sld>
 </file>
 
+<file path=ppt/slides/slide30.xml><?xml version="1.0" encoding="utf-8"?>
+<p:sld xmlns:a="http://schemas.openxmlformats.org/drawingml/2006/main" xmlns:r="http://schemas.openxmlformats.org/officeDocument/2006/relationships" xmlns:p="http://schemas.openxmlformats.org/presentationml/2006/main">
+  <p:cSld>
+    <p:spTree>
+      <p:nvGrpSpPr>
+        <p:cNvPr id="1" name=""/>
+        <p:cNvGrpSpPr/>
+        <p:nvPr/>
+      </p:nvGrpSpPr>
+      <p:grpSpPr>
+        <a:xfrm>
+          <a:off x="0" y="0"/>
+          <a:ext cx="0" cy="0"/>
+          <a:chOff x="0" y="0"/>
+          <a:chExt cx="0" cy="0"/>
+        </a:xfrm>
+      </p:grpSpPr>
+      <p:sp>
+        <p:nvSpPr>
+          <p:cNvPr id="2" name="Title 1">
+            <a:extLst>
+              <a:ext uri="{FF2B5EF4-FFF2-40B4-BE49-F238E27FC236}">
+                <a16:creationId xmlns:a16="http://schemas.microsoft.com/office/drawing/2014/main" id="{6BF0510B-BD3C-2568-07D7-0147D2CA5353}"/>
+              </a:ext>
+            </a:extLst>
+          </p:cNvPr>
+          <p:cNvSpPr>
+            <a:spLocks noGrp="1"/>
+          </p:cNvSpPr>
+          <p:nvPr>
+            <p:ph type="ctrTitle"/>
+          </p:nvPr>
+        </p:nvSpPr>
+        <p:spPr>
+          <a:xfrm>
+            <a:off x="437803" y="2433013"/>
+            <a:ext cx="10782300" cy="3352800"/>
+          </a:xfrm>
+        </p:spPr>
+        <p:txBody>
+          <a:bodyPr/>
+          <a:lstStyle/>
+          <a:p>
+            <a:r>
+              <a:rPr lang="en-US" dirty="0"/>
+              <a:t>Meeting 2/5/24</a:t>
+            </a:r>
+          </a:p>
+        </p:txBody>
+      </p:sp>
+      <p:pic>
+        <p:nvPicPr>
+          <p:cNvPr id="4" name="Picture 3">
+            <a:extLst>
+              <a:ext uri="{FF2B5EF4-FFF2-40B4-BE49-F238E27FC236}">
+                <a16:creationId xmlns:a16="http://schemas.microsoft.com/office/drawing/2014/main" id="{305340EB-3C4F-31DE-4D94-A872FF497C6A}"/>
+              </a:ext>
+            </a:extLst>
+          </p:cNvPr>
+          <p:cNvPicPr>
+            <a:picLocks noChangeAspect="1"/>
+          </p:cNvPicPr>
+          <p:nvPr/>
+        </p:nvPicPr>
+        <p:blipFill>
+          <a:blip r:embed="rId2"/>
+          <a:stretch>
+            <a:fillRect/>
+          </a:stretch>
+        </p:blipFill>
+        <p:spPr>
+          <a:xfrm>
+            <a:off x="4330840" y="496572"/>
+            <a:ext cx="7057597" cy="3381315"/>
+          </a:xfrm>
+          <a:prstGeom prst="rect">
+            <a:avLst/>
+          </a:prstGeom>
+        </p:spPr>
+      </p:pic>
+    </p:spTree>
+    <p:extLst>
+      <p:ext uri="{BB962C8B-B14F-4D97-AF65-F5344CB8AC3E}">
+        <p14:creationId xmlns:p14="http://schemas.microsoft.com/office/powerpoint/2010/main" val="2169339395"/>
+      </p:ext>
+    </p:extLst>
+  </p:cSld>
+  <p:clrMapOvr>
+    <a:masterClrMapping/>
+  </p:clrMapOvr>
+</p:sld>
+</file>
+
+<file path=ppt/slides/slide31.xml><?xml version="1.0" encoding="utf-8"?>
+<p:sld xmlns:a="http://schemas.openxmlformats.org/drawingml/2006/main" xmlns:r="http://schemas.openxmlformats.org/officeDocument/2006/relationships" xmlns:p="http://schemas.openxmlformats.org/presentationml/2006/main">
+  <p:cSld>
+    <p:spTree>
+      <p:nvGrpSpPr>
+        <p:cNvPr id="1" name=""/>
+        <p:cNvGrpSpPr/>
+        <p:nvPr/>
+      </p:nvGrpSpPr>
+      <p:grpSpPr>
+        <a:xfrm>
+          <a:off x="0" y="0"/>
+          <a:ext cx="0" cy="0"/>
+          <a:chOff x="0" y="0"/>
+          <a:chExt cx="0" cy="0"/>
+        </a:xfrm>
+      </p:grpSpPr>
+      <p:sp>
+        <p:nvSpPr>
+          <p:cNvPr id="2" name="Title 1">
+            <a:extLst>
+              <a:ext uri="{FF2B5EF4-FFF2-40B4-BE49-F238E27FC236}">
+                <a16:creationId xmlns:a16="http://schemas.microsoft.com/office/drawing/2014/main" id="{B36FE966-E591-37C5-96CE-F95CDF77A32E}"/>
+              </a:ext>
+            </a:extLst>
+          </p:cNvPr>
+          <p:cNvSpPr>
+            <a:spLocks noGrp="1"/>
+          </p:cNvSpPr>
+          <p:nvPr>
+            <p:ph type="title"/>
+          </p:nvPr>
+        </p:nvSpPr>
+        <p:spPr>
+          <a:xfrm>
+            <a:off x="590723" y="-66503"/>
+            <a:ext cx="10772775" cy="1658198"/>
+          </a:xfrm>
+        </p:spPr>
+        <p:txBody>
+          <a:bodyPr/>
+          <a:lstStyle/>
+          <a:p>
+            <a:r>
+              <a:rPr lang="en-US" dirty="0"/>
+              <a:t>Messing Around w/ the Scoring Function</a:t>
+            </a:r>
+            <a:br>
+              <a:rPr lang="en-US" dirty="0"/>
+            </a:br>
+            <a:r>
+              <a:rPr lang="en-US" sz="2000" i="1" dirty="0"/>
+              <a:t>(goal: try and loosen the restrictions to avoid the step-function-looking result.)</a:t>
+            </a:r>
+            <a:endParaRPr lang="en-US" dirty="0"/>
+          </a:p>
+        </p:txBody>
+      </p:sp>
+      <p:pic>
+        <p:nvPicPr>
+          <p:cNvPr id="4" name="Picture 3">
+            <a:extLst>
+              <a:ext uri="{FF2B5EF4-FFF2-40B4-BE49-F238E27FC236}">
+                <a16:creationId xmlns:a16="http://schemas.microsoft.com/office/drawing/2014/main" id="{928B296C-F39B-CF4A-AC1D-A993ACAD6E25}"/>
+              </a:ext>
+            </a:extLst>
+          </p:cNvPr>
+          <p:cNvPicPr>
+            <a:picLocks noChangeAspect="1"/>
+          </p:cNvPicPr>
+          <p:nvPr/>
+        </p:nvPicPr>
+        <p:blipFill>
+          <a:blip r:embed="rId2"/>
+          <a:stretch>
+            <a:fillRect/>
+          </a:stretch>
+        </p:blipFill>
+        <p:spPr>
+          <a:xfrm>
+            <a:off x="2621019" y="1658198"/>
+            <a:ext cx="9344025" cy="4476750"/>
+          </a:xfrm>
+          <a:prstGeom prst="rect">
+            <a:avLst/>
+          </a:prstGeom>
+        </p:spPr>
+      </p:pic>
+      <p:sp>
+        <p:nvSpPr>
+          <p:cNvPr id="6" name="TextBox 5">
+            <a:extLst>
+              <a:ext uri="{FF2B5EF4-FFF2-40B4-BE49-F238E27FC236}">
+                <a16:creationId xmlns:a16="http://schemas.microsoft.com/office/drawing/2014/main" id="{E34CFD9C-83F1-E802-39C5-636C37BF376C}"/>
+              </a:ext>
+            </a:extLst>
+          </p:cNvPr>
+          <p:cNvSpPr txBox="1"/>
+          <p:nvPr/>
+        </p:nvSpPr>
+        <p:spPr>
+          <a:xfrm>
+            <a:off x="226956" y="4886467"/>
+            <a:ext cx="3995909" cy="1477328"/>
+          </a:xfrm>
+          <a:prstGeom prst="rect">
+            <a:avLst/>
+          </a:prstGeom>
+          <a:noFill/>
+        </p:spPr>
+        <p:txBody>
+          <a:bodyPr wrap="square">
+            <a:spAutoFit/>
+          </a:bodyPr>
+          <a:lstStyle/>
+          <a:p>
+            <a:r>
+              <a:rPr lang="en-US" b="0" dirty="0">
+                <a:solidFill>
+                  <a:schemeClr val="accent1">
+                    <a:lumMod val="50000"/>
+                  </a:schemeClr>
+                </a:solidFill>
+                <a:effectLst/>
+                <a:latin typeface="Consolas" panose="020B0609020204030204" pitchFamily="49" charset="0"/>
+              </a:rPr>
+              <a:t>Here</a:t>
+            </a:r>
+          </a:p>
+          <a:p>
+            <a:r>
+              <a:rPr lang="en-US" b="0" dirty="0">
+                <a:solidFill>
+                  <a:schemeClr val="accent1"/>
+                </a:solidFill>
+                <a:effectLst/>
+                <a:latin typeface="Consolas" panose="020B0609020204030204" pitchFamily="49" charset="0"/>
+              </a:rPr>
+              <a:t>alpha = 0.3 </a:t>
+            </a:r>
+            <a:r>
+              <a:rPr lang="en-US" b="0" dirty="0">
+                <a:solidFill>
+                  <a:schemeClr val="bg1">
+                    <a:lumMod val="65000"/>
+                  </a:schemeClr>
+                </a:solidFill>
+                <a:effectLst/>
+                <a:latin typeface="Consolas" panose="020B0609020204030204" pitchFamily="49" charset="0"/>
+              </a:rPr>
+              <a:t>video length</a:t>
+            </a:r>
+          </a:p>
+          <a:p>
+            <a:r>
+              <a:rPr lang="en-US" b="0" dirty="0">
+                <a:solidFill>
+                  <a:schemeClr val="accent1"/>
+                </a:solidFill>
+                <a:effectLst/>
+                <a:latin typeface="Consolas" panose="020B0609020204030204" pitchFamily="49" charset="0"/>
+              </a:rPr>
+              <a:t>beta = 0.3  </a:t>
+            </a:r>
+            <a:r>
+              <a:rPr lang="en-US" b="0" dirty="0">
+                <a:solidFill>
+                  <a:schemeClr val="bg1">
+                    <a:lumMod val="65000"/>
+                  </a:schemeClr>
+                </a:solidFill>
+                <a:effectLst/>
+                <a:latin typeface="Consolas" panose="020B0609020204030204" pitchFamily="49" charset="0"/>
+              </a:rPr>
+              <a:t>video popularity</a:t>
+            </a:r>
+          </a:p>
+          <a:p>
+            <a:r>
+              <a:rPr lang="en-US" b="0" dirty="0">
+                <a:solidFill>
+                  <a:schemeClr val="accent1"/>
+                </a:solidFill>
+                <a:effectLst/>
+                <a:latin typeface="Consolas" panose="020B0609020204030204" pitchFamily="49" charset="0"/>
+              </a:rPr>
+              <a:t>gamma = 0.1 </a:t>
+            </a:r>
+            <a:r>
+              <a:rPr lang="en-US" b="0" dirty="0">
+                <a:solidFill>
+                  <a:schemeClr val="bg1">
+                    <a:lumMod val="65000"/>
+                  </a:schemeClr>
+                </a:solidFill>
+                <a:effectLst/>
+                <a:latin typeface="Consolas" panose="020B0609020204030204" pitchFamily="49" charset="0"/>
+              </a:rPr>
+              <a:t>video alignment </a:t>
+            </a:r>
+            <a:r>
+              <a:rPr lang="en-US" b="0" dirty="0">
+                <a:solidFill>
+                  <a:schemeClr val="accent1"/>
+                </a:solidFill>
+                <a:effectLst/>
+                <a:latin typeface="Consolas" panose="020B0609020204030204" pitchFamily="49" charset="0"/>
+              </a:rPr>
+              <a:t>delta = 0.3 </a:t>
+            </a:r>
+            <a:r>
+              <a:rPr lang="en-US" b="0" dirty="0">
+                <a:solidFill>
+                  <a:schemeClr val="bg1">
+                    <a:lumMod val="65000"/>
+                  </a:schemeClr>
+                </a:solidFill>
+                <a:effectLst/>
+                <a:latin typeface="Consolas" panose="020B0609020204030204" pitchFamily="49" charset="0"/>
+              </a:rPr>
+              <a:t>video extremeness</a:t>
+            </a:r>
+          </a:p>
+        </p:txBody>
+      </p:sp>
+      <p:sp>
+        <p:nvSpPr>
+          <p:cNvPr id="8" name="TextBox 7">
+            <a:extLst>
+              <a:ext uri="{FF2B5EF4-FFF2-40B4-BE49-F238E27FC236}">
+                <a16:creationId xmlns:a16="http://schemas.microsoft.com/office/drawing/2014/main" id="{E441CD13-98A5-C7AF-E40A-5EDB6530AA29}"/>
+              </a:ext>
+            </a:extLst>
+          </p:cNvPr>
+          <p:cNvSpPr txBox="1"/>
+          <p:nvPr/>
+        </p:nvSpPr>
+        <p:spPr>
+          <a:xfrm>
+            <a:off x="226956" y="2874556"/>
+            <a:ext cx="3857364" cy="1754326"/>
+          </a:xfrm>
+          <a:prstGeom prst="rect">
+            <a:avLst/>
+          </a:prstGeom>
+          <a:noFill/>
+        </p:spPr>
+        <p:txBody>
+          <a:bodyPr wrap="square">
+            <a:spAutoFit/>
+          </a:bodyPr>
+          <a:lstStyle/>
+          <a:p>
+            <a:r>
+              <a:rPr lang="en-US" b="0" dirty="0">
+                <a:solidFill>
+                  <a:schemeClr val="accent1">
+                    <a:lumMod val="50000"/>
+                  </a:schemeClr>
+                </a:solidFill>
+                <a:effectLst/>
+                <a:latin typeface="Consolas" panose="020B0609020204030204" pitchFamily="49" charset="0"/>
+              </a:rPr>
+              <a:t>Original</a:t>
+            </a:r>
+          </a:p>
+          <a:p>
+            <a:r>
+              <a:rPr lang="en-US" b="0" dirty="0">
+                <a:solidFill>
+                  <a:schemeClr val="accent1"/>
+                </a:solidFill>
+                <a:effectLst/>
+                <a:latin typeface="Consolas" panose="020B0609020204030204" pitchFamily="49" charset="0"/>
+              </a:rPr>
+              <a:t>alpha = 0.2 </a:t>
+            </a:r>
+            <a:r>
+              <a:rPr lang="en-US" b="0" dirty="0">
+                <a:solidFill>
+                  <a:schemeClr val="bg1">
+                    <a:lumMod val="65000"/>
+                  </a:schemeClr>
+                </a:solidFill>
+                <a:effectLst/>
+                <a:latin typeface="Consolas" panose="020B0609020204030204" pitchFamily="49" charset="0"/>
+              </a:rPr>
+              <a:t>video length</a:t>
+            </a:r>
+          </a:p>
+          <a:p>
+            <a:r>
+              <a:rPr lang="en-US" b="0" dirty="0">
+                <a:solidFill>
+                  <a:schemeClr val="accent1"/>
+                </a:solidFill>
+                <a:effectLst/>
+                <a:latin typeface="Consolas" panose="020B0609020204030204" pitchFamily="49" charset="0"/>
+              </a:rPr>
+              <a:t>beta = 0.15  </a:t>
+            </a:r>
+            <a:r>
+              <a:rPr lang="en-US" b="0" dirty="0">
+                <a:solidFill>
+                  <a:schemeClr val="bg1">
+                    <a:lumMod val="65000"/>
+                  </a:schemeClr>
+                </a:solidFill>
+                <a:effectLst/>
+                <a:latin typeface="Consolas" panose="020B0609020204030204" pitchFamily="49" charset="0"/>
+              </a:rPr>
+              <a:t>video popularity</a:t>
+            </a:r>
+          </a:p>
+          <a:p>
+            <a:r>
+              <a:rPr lang="en-US" b="0" dirty="0">
+                <a:solidFill>
+                  <a:schemeClr val="accent1"/>
+                </a:solidFill>
+                <a:effectLst/>
+                <a:latin typeface="Consolas" panose="020B0609020204030204" pitchFamily="49" charset="0"/>
+              </a:rPr>
+              <a:t>gamma = 0.5 </a:t>
+            </a:r>
+            <a:r>
+              <a:rPr lang="en-US" b="0" dirty="0">
+                <a:solidFill>
+                  <a:schemeClr val="bg1">
+                    <a:lumMod val="65000"/>
+                  </a:schemeClr>
+                </a:solidFill>
+                <a:effectLst/>
+                <a:latin typeface="Consolas" panose="020B0609020204030204" pitchFamily="49" charset="0"/>
+              </a:rPr>
+              <a:t>video alignment </a:t>
+            </a:r>
+            <a:r>
+              <a:rPr lang="en-US" b="0" dirty="0">
+                <a:solidFill>
+                  <a:schemeClr val="accent1"/>
+                </a:solidFill>
+                <a:effectLst/>
+                <a:latin typeface="Consolas" panose="020B0609020204030204" pitchFamily="49" charset="0"/>
+              </a:rPr>
+              <a:t>delta = 0.15 </a:t>
+            </a:r>
+            <a:r>
+              <a:rPr lang="en-US" b="0" dirty="0">
+                <a:solidFill>
+                  <a:schemeClr val="bg1">
+                    <a:lumMod val="65000"/>
+                  </a:schemeClr>
+                </a:solidFill>
+                <a:effectLst/>
+                <a:latin typeface="Consolas" panose="020B0609020204030204" pitchFamily="49" charset="0"/>
+              </a:rPr>
+              <a:t>video extremeness</a:t>
+            </a:r>
+          </a:p>
+        </p:txBody>
+      </p:sp>
+    </p:spTree>
+    <p:extLst>
+      <p:ext uri="{BB962C8B-B14F-4D97-AF65-F5344CB8AC3E}">
+        <p14:creationId xmlns:p14="http://schemas.microsoft.com/office/powerpoint/2010/main" val="1376720515"/>
+      </p:ext>
+    </p:extLst>
+  </p:cSld>
+  <p:clrMapOvr>
+    <a:masterClrMapping/>
+  </p:clrMapOvr>
+</p:sld>
+</file>
+
+<file path=ppt/slides/slide32.xml><?xml version="1.0" encoding="utf-8"?>
+<p:sld xmlns:a="http://schemas.openxmlformats.org/drawingml/2006/main" xmlns:r="http://schemas.openxmlformats.org/officeDocument/2006/relationships" xmlns:p="http://schemas.openxmlformats.org/presentationml/2006/main">
+  <p:cSld>
+    <p:spTree>
+      <p:nvGrpSpPr>
+        <p:cNvPr id="1" name="">
+          <a:extLst>
+            <a:ext uri="{FF2B5EF4-FFF2-40B4-BE49-F238E27FC236}">
+              <a16:creationId xmlns:a16="http://schemas.microsoft.com/office/drawing/2014/main" id="{9F30FD84-30D3-74A8-31E8-7E7BEFAD8D83}"/>
+            </a:ext>
+          </a:extLst>
+        </p:cNvPr>
+        <p:cNvGrpSpPr/>
+        <p:nvPr/>
+      </p:nvGrpSpPr>
+      <p:grpSpPr>
+        <a:xfrm>
+          <a:off x="0" y="0"/>
+          <a:ext cx="0" cy="0"/>
+          <a:chOff x="0" y="0"/>
+          <a:chExt cx="0" cy="0"/>
+        </a:xfrm>
+      </p:grpSpPr>
+      <p:pic>
+        <p:nvPicPr>
+          <p:cNvPr id="5" name="Picture 4">
+            <a:extLst>
+              <a:ext uri="{FF2B5EF4-FFF2-40B4-BE49-F238E27FC236}">
+                <a16:creationId xmlns:a16="http://schemas.microsoft.com/office/drawing/2014/main" id="{585112E8-CC6D-F7AC-6A4C-4EEC136940E7}"/>
+              </a:ext>
+            </a:extLst>
+          </p:cNvPr>
+          <p:cNvPicPr>
+            <a:picLocks noChangeAspect="1"/>
+          </p:cNvPicPr>
+          <p:nvPr/>
+        </p:nvPicPr>
+        <p:blipFill>
+          <a:blip r:embed="rId2"/>
+          <a:stretch>
+            <a:fillRect/>
+          </a:stretch>
+        </p:blipFill>
+        <p:spPr>
+          <a:xfrm>
+            <a:off x="2847975" y="1911061"/>
+            <a:ext cx="9344025" cy="4476750"/>
+          </a:xfrm>
+          <a:prstGeom prst="rect">
+            <a:avLst/>
+          </a:prstGeom>
+        </p:spPr>
+      </p:pic>
+      <p:sp>
+        <p:nvSpPr>
+          <p:cNvPr id="2" name="Title 1">
+            <a:extLst>
+              <a:ext uri="{FF2B5EF4-FFF2-40B4-BE49-F238E27FC236}">
+                <a16:creationId xmlns:a16="http://schemas.microsoft.com/office/drawing/2014/main" id="{08590059-60B9-0210-9E49-72312B6341B5}"/>
+              </a:ext>
+            </a:extLst>
+          </p:cNvPr>
+          <p:cNvSpPr>
+            <a:spLocks noGrp="1"/>
+          </p:cNvSpPr>
+          <p:nvPr>
+            <p:ph type="title"/>
+          </p:nvPr>
+        </p:nvSpPr>
+        <p:spPr>
+          <a:xfrm>
+            <a:off x="590723" y="-66503"/>
+            <a:ext cx="10772775" cy="1658198"/>
+          </a:xfrm>
+        </p:spPr>
+        <p:txBody>
+          <a:bodyPr/>
+          <a:lstStyle/>
+          <a:p>
+            <a:r>
+              <a:rPr lang="en-US" dirty="0"/>
+              <a:t>Messing Around w/ the Scoring Function</a:t>
+            </a:r>
+            <a:br>
+              <a:rPr lang="en-US" dirty="0"/>
+            </a:br>
+            <a:r>
+              <a:rPr lang="en-US" sz="2000" i="1" dirty="0"/>
+              <a:t>(goal: try and loosen the restrictions to avoid the step-function-looking result.)</a:t>
+            </a:r>
+            <a:endParaRPr lang="en-US" dirty="0"/>
+          </a:p>
+        </p:txBody>
+      </p:sp>
+      <p:sp>
+        <p:nvSpPr>
+          <p:cNvPr id="6" name="TextBox 5">
+            <a:extLst>
+              <a:ext uri="{FF2B5EF4-FFF2-40B4-BE49-F238E27FC236}">
+                <a16:creationId xmlns:a16="http://schemas.microsoft.com/office/drawing/2014/main" id="{F0A4D993-729C-2B2F-94B0-D91D21C32BEB}"/>
+              </a:ext>
+            </a:extLst>
+          </p:cNvPr>
+          <p:cNvSpPr txBox="1"/>
+          <p:nvPr/>
+        </p:nvSpPr>
+        <p:spPr>
+          <a:xfrm>
+            <a:off x="226956" y="4886467"/>
+            <a:ext cx="3995909" cy="1477328"/>
+          </a:xfrm>
+          <a:prstGeom prst="rect">
+            <a:avLst/>
+          </a:prstGeom>
+          <a:noFill/>
+        </p:spPr>
+        <p:txBody>
+          <a:bodyPr wrap="square">
+            <a:spAutoFit/>
+          </a:bodyPr>
+          <a:lstStyle/>
+          <a:p>
+            <a:r>
+              <a:rPr lang="en-US" b="0" dirty="0">
+                <a:solidFill>
+                  <a:schemeClr val="accent1">
+                    <a:lumMod val="50000"/>
+                  </a:schemeClr>
+                </a:solidFill>
+                <a:effectLst/>
+                <a:latin typeface="Consolas" panose="020B0609020204030204" pitchFamily="49" charset="0"/>
+              </a:rPr>
+              <a:t>Here</a:t>
+            </a:r>
+          </a:p>
+          <a:p>
+            <a:r>
+              <a:rPr lang="en-US" b="0" dirty="0">
+                <a:solidFill>
+                  <a:schemeClr val="accent1"/>
+                </a:solidFill>
+                <a:effectLst/>
+                <a:latin typeface="Consolas" panose="020B0609020204030204" pitchFamily="49" charset="0"/>
+              </a:rPr>
+              <a:t>alpha = 0.2 </a:t>
+            </a:r>
+            <a:r>
+              <a:rPr lang="en-US" b="0" dirty="0">
+                <a:solidFill>
+                  <a:schemeClr val="bg1">
+                    <a:lumMod val="65000"/>
+                  </a:schemeClr>
+                </a:solidFill>
+                <a:effectLst/>
+                <a:latin typeface="Consolas" panose="020B0609020204030204" pitchFamily="49" charset="0"/>
+              </a:rPr>
+              <a:t>video length</a:t>
+            </a:r>
+          </a:p>
+          <a:p>
+            <a:r>
+              <a:rPr lang="en-US" b="0" dirty="0">
+                <a:solidFill>
+                  <a:schemeClr val="accent1"/>
+                </a:solidFill>
+                <a:effectLst/>
+                <a:latin typeface="Consolas" panose="020B0609020204030204" pitchFamily="49" charset="0"/>
+              </a:rPr>
+              <a:t>beta = 0.3  </a:t>
+            </a:r>
+            <a:r>
+              <a:rPr lang="en-US" b="0" dirty="0">
+                <a:solidFill>
+                  <a:schemeClr val="bg1">
+                    <a:lumMod val="65000"/>
+                  </a:schemeClr>
+                </a:solidFill>
+                <a:effectLst/>
+                <a:latin typeface="Consolas" panose="020B0609020204030204" pitchFamily="49" charset="0"/>
+              </a:rPr>
+              <a:t>video popularity</a:t>
+            </a:r>
+          </a:p>
+          <a:p>
+            <a:r>
+              <a:rPr lang="en-US" b="0" dirty="0">
+                <a:solidFill>
+                  <a:schemeClr val="accent1"/>
+                </a:solidFill>
+                <a:effectLst/>
+                <a:latin typeface="Consolas" panose="020B0609020204030204" pitchFamily="49" charset="0"/>
+              </a:rPr>
+              <a:t>gamma = 0.2 </a:t>
+            </a:r>
+            <a:r>
+              <a:rPr lang="en-US" b="0" dirty="0">
+                <a:solidFill>
+                  <a:schemeClr val="bg1">
+                    <a:lumMod val="65000"/>
+                  </a:schemeClr>
+                </a:solidFill>
+                <a:effectLst/>
+                <a:latin typeface="Consolas" panose="020B0609020204030204" pitchFamily="49" charset="0"/>
+              </a:rPr>
+              <a:t>video alignment </a:t>
+            </a:r>
+            <a:r>
+              <a:rPr lang="en-US" b="0" dirty="0">
+                <a:solidFill>
+                  <a:schemeClr val="accent1"/>
+                </a:solidFill>
+                <a:effectLst/>
+                <a:latin typeface="Consolas" panose="020B0609020204030204" pitchFamily="49" charset="0"/>
+              </a:rPr>
+              <a:t>delta = 0.2 </a:t>
+            </a:r>
+            <a:r>
+              <a:rPr lang="en-US" b="0" dirty="0">
+                <a:solidFill>
+                  <a:schemeClr val="bg1">
+                    <a:lumMod val="65000"/>
+                  </a:schemeClr>
+                </a:solidFill>
+                <a:effectLst/>
+                <a:latin typeface="Consolas" panose="020B0609020204030204" pitchFamily="49" charset="0"/>
+              </a:rPr>
+              <a:t>video extremeness</a:t>
+            </a:r>
+          </a:p>
+        </p:txBody>
+      </p:sp>
+      <p:sp>
+        <p:nvSpPr>
+          <p:cNvPr id="8" name="TextBox 7">
+            <a:extLst>
+              <a:ext uri="{FF2B5EF4-FFF2-40B4-BE49-F238E27FC236}">
+                <a16:creationId xmlns:a16="http://schemas.microsoft.com/office/drawing/2014/main" id="{E1F5F23E-EB4B-B65B-9EE9-F9FD404DC0F8}"/>
+              </a:ext>
+            </a:extLst>
+          </p:cNvPr>
+          <p:cNvSpPr txBox="1"/>
+          <p:nvPr/>
+        </p:nvSpPr>
+        <p:spPr>
+          <a:xfrm>
+            <a:off x="226956" y="2874556"/>
+            <a:ext cx="3857364" cy="1754326"/>
+          </a:xfrm>
+          <a:prstGeom prst="rect">
+            <a:avLst/>
+          </a:prstGeom>
+          <a:noFill/>
+        </p:spPr>
+        <p:txBody>
+          <a:bodyPr wrap="square">
+            <a:spAutoFit/>
+          </a:bodyPr>
+          <a:lstStyle/>
+          <a:p>
+            <a:r>
+              <a:rPr lang="en-US" b="0" dirty="0">
+                <a:solidFill>
+                  <a:schemeClr val="accent1">
+                    <a:lumMod val="50000"/>
+                  </a:schemeClr>
+                </a:solidFill>
+                <a:effectLst/>
+                <a:latin typeface="Consolas" panose="020B0609020204030204" pitchFamily="49" charset="0"/>
+              </a:rPr>
+              <a:t>Original</a:t>
+            </a:r>
+          </a:p>
+          <a:p>
+            <a:r>
+              <a:rPr lang="en-US" b="0" dirty="0">
+                <a:solidFill>
+                  <a:schemeClr val="accent1"/>
+                </a:solidFill>
+                <a:effectLst/>
+                <a:latin typeface="Consolas" panose="020B0609020204030204" pitchFamily="49" charset="0"/>
+              </a:rPr>
+              <a:t>alpha = 0.2 </a:t>
+            </a:r>
+            <a:r>
+              <a:rPr lang="en-US" b="0" dirty="0">
+                <a:solidFill>
+                  <a:schemeClr val="bg1">
+                    <a:lumMod val="65000"/>
+                  </a:schemeClr>
+                </a:solidFill>
+                <a:effectLst/>
+                <a:latin typeface="Consolas" panose="020B0609020204030204" pitchFamily="49" charset="0"/>
+              </a:rPr>
+              <a:t>video length</a:t>
+            </a:r>
+          </a:p>
+          <a:p>
+            <a:r>
+              <a:rPr lang="en-US" b="0" dirty="0">
+                <a:solidFill>
+                  <a:schemeClr val="accent1"/>
+                </a:solidFill>
+                <a:effectLst/>
+                <a:latin typeface="Consolas" panose="020B0609020204030204" pitchFamily="49" charset="0"/>
+              </a:rPr>
+              <a:t>beta = 0.15  </a:t>
+            </a:r>
+            <a:r>
+              <a:rPr lang="en-US" b="0" dirty="0">
+                <a:solidFill>
+                  <a:schemeClr val="bg1">
+                    <a:lumMod val="65000"/>
+                  </a:schemeClr>
+                </a:solidFill>
+                <a:effectLst/>
+                <a:latin typeface="Consolas" panose="020B0609020204030204" pitchFamily="49" charset="0"/>
+              </a:rPr>
+              <a:t>video popularity</a:t>
+            </a:r>
+          </a:p>
+          <a:p>
+            <a:r>
+              <a:rPr lang="en-US" b="0" dirty="0">
+                <a:solidFill>
+                  <a:schemeClr val="accent1"/>
+                </a:solidFill>
+                <a:effectLst/>
+                <a:latin typeface="Consolas" panose="020B0609020204030204" pitchFamily="49" charset="0"/>
+              </a:rPr>
+              <a:t>gamma = 0.5 </a:t>
+            </a:r>
+            <a:r>
+              <a:rPr lang="en-US" b="0" dirty="0">
+                <a:solidFill>
+                  <a:schemeClr val="bg1">
+                    <a:lumMod val="65000"/>
+                  </a:schemeClr>
+                </a:solidFill>
+                <a:effectLst/>
+                <a:latin typeface="Consolas" panose="020B0609020204030204" pitchFamily="49" charset="0"/>
+              </a:rPr>
+              <a:t>video alignment </a:t>
+            </a:r>
+            <a:r>
+              <a:rPr lang="en-US" b="0" dirty="0">
+                <a:solidFill>
+                  <a:schemeClr val="accent1"/>
+                </a:solidFill>
+                <a:effectLst/>
+                <a:latin typeface="Consolas" panose="020B0609020204030204" pitchFamily="49" charset="0"/>
+              </a:rPr>
+              <a:t>delta = 0.15 </a:t>
+            </a:r>
+            <a:r>
+              <a:rPr lang="en-US" b="0" dirty="0">
+                <a:solidFill>
+                  <a:schemeClr val="bg1">
+                    <a:lumMod val="65000"/>
+                  </a:schemeClr>
+                </a:solidFill>
+                <a:effectLst/>
+                <a:latin typeface="Consolas" panose="020B0609020204030204" pitchFamily="49" charset="0"/>
+              </a:rPr>
+              <a:t>video extremeness</a:t>
+            </a:r>
+          </a:p>
+        </p:txBody>
+      </p:sp>
+    </p:spTree>
+    <p:extLst>
+      <p:ext uri="{BB962C8B-B14F-4D97-AF65-F5344CB8AC3E}">
+        <p14:creationId xmlns:p14="http://schemas.microsoft.com/office/powerpoint/2010/main" val="3509288458"/>
+      </p:ext>
+    </p:extLst>
+  </p:cSld>
+  <p:clrMapOvr>
+    <a:masterClrMapping/>
+  </p:clrMapOvr>
+</p:sld>
+</file>
+
+<file path=ppt/slides/slide33.xml><?xml version="1.0" encoding="utf-8"?>
+<p:sld xmlns:a="http://schemas.openxmlformats.org/drawingml/2006/main" xmlns:r="http://schemas.openxmlformats.org/officeDocument/2006/relationships" xmlns:p="http://schemas.openxmlformats.org/presentationml/2006/main">
+  <p:cSld>
+    <p:spTree>
+      <p:nvGrpSpPr>
+        <p:cNvPr id="1" name="">
+          <a:extLst>
+            <a:ext uri="{FF2B5EF4-FFF2-40B4-BE49-F238E27FC236}">
+              <a16:creationId xmlns:a16="http://schemas.microsoft.com/office/drawing/2014/main" id="{BD52A00A-4678-A094-5188-CAA60C137BA4}"/>
+            </a:ext>
+          </a:extLst>
+        </p:cNvPr>
+        <p:cNvGrpSpPr/>
+        <p:nvPr/>
+      </p:nvGrpSpPr>
+      <p:grpSpPr>
+        <a:xfrm>
+          <a:off x="0" y="0"/>
+          <a:ext cx="0" cy="0"/>
+          <a:chOff x="0" y="0"/>
+          <a:chExt cx="0" cy="0"/>
+        </a:xfrm>
+      </p:grpSpPr>
+      <p:pic>
+        <p:nvPicPr>
+          <p:cNvPr id="4" name="Picture 3">
+            <a:extLst>
+              <a:ext uri="{FF2B5EF4-FFF2-40B4-BE49-F238E27FC236}">
+                <a16:creationId xmlns:a16="http://schemas.microsoft.com/office/drawing/2014/main" id="{1EFF9400-26E9-E4E6-64D4-5FD25E29EFCB}"/>
+              </a:ext>
+            </a:extLst>
+          </p:cNvPr>
+          <p:cNvPicPr>
+            <a:picLocks noChangeAspect="1"/>
+          </p:cNvPicPr>
+          <p:nvPr/>
+        </p:nvPicPr>
+        <p:blipFill>
+          <a:blip r:embed="rId2"/>
+          <a:stretch>
+            <a:fillRect/>
+          </a:stretch>
+        </p:blipFill>
+        <p:spPr>
+          <a:xfrm>
+            <a:off x="2781732" y="1887045"/>
+            <a:ext cx="9344025" cy="4476750"/>
+          </a:xfrm>
+          <a:prstGeom prst="rect">
+            <a:avLst/>
+          </a:prstGeom>
+        </p:spPr>
+      </p:pic>
+      <p:sp>
+        <p:nvSpPr>
+          <p:cNvPr id="2" name="Title 1">
+            <a:extLst>
+              <a:ext uri="{FF2B5EF4-FFF2-40B4-BE49-F238E27FC236}">
+                <a16:creationId xmlns:a16="http://schemas.microsoft.com/office/drawing/2014/main" id="{C368FB52-5055-1DBA-605A-A366E5CB4FB5}"/>
+              </a:ext>
+            </a:extLst>
+          </p:cNvPr>
+          <p:cNvSpPr>
+            <a:spLocks noGrp="1"/>
+          </p:cNvSpPr>
+          <p:nvPr>
+            <p:ph type="title"/>
+          </p:nvPr>
+        </p:nvSpPr>
+        <p:spPr>
+          <a:xfrm>
+            <a:off x="590723" y="-66503"/>
+            <a:ext cx="10772775" cy="1658198"/>
+          </a:xfrm>
+        </p:spPr>
+        <p:txBody>
+          <a:bodyPr/>
+          <a:lstStyle/>
+          <a:p>
+            <a:r>
+              <a:rPr lang="en-US" dirty="0"/>
+              <a:t>Messing Around w/ the Scoring Function</a:t>
+            </a:r>
+            <a:br>
+              <a:rPr lang="en-US" dirty="0"/>
+            </a:br>
+            <a:r>
+              <a:rPr lang="en-US" sz="2000" i="1" dirty="0"/>
+              <a:t>(goal: try and loosen the restrictions to avoid the step-function-looking result.)</a:t>
+            </a:r>
+            <a:endParaRPr lang="en-US" dirty="0"/>
+          </a:p>
+        </p:txBody>
+      </p:sp>
+      <p:sp>
+        <p:nvSpPr>
+          <p:cNvPr id="6" name="TextBox 5">
+            <a:extLst>
+              <a:ext uri="{FF2B5EF4-FFF2-40B4-BE49-F238E27FC236}">
+                <a16:creationId xmlns:a16="http://schemas.microsoft.com/office/drawing/2014/main" id="{E681C7A5-BCB9-F688-307F-7914E99FBD15}"/>
+              </a:ext>
+            </a:extLst>
+          </p:cNvPr>
+          <p:cNvSpPr txBox="1"/>
+          <p:nvPr/>
+        </p:nvSpPr>
+        <p:spPr>
+          <a:xfrm>
+            <a:off x="226956" y="4886467"/>
+            <a:ext cx="3995909" cy="2308324"/>
+          </a:xfrm>
+          <a:prstGeom prst="rect">
+            <a:avLst/>
+          </a:prstGeom>
+          <a:noFill/>
+        </p:spPr>
+        <p:txBody>
+          <a:bodyPr wrap="square">
+            <a:spAutoFit/>
+          </a:bodyPr>
+          <a:lstStyle/>
+          <a:p>
+            <a:r>
+              <a:rPr lang="en-US" b="0" dirty="0">
+                <a:solidFill>
+                  <a:schemeClr val="accent1">
+                    <a:lumMod val="50000"/>
+                  </a:schemeClr>
+                </a:solidFill>
+                <a:effectLst/>
+                <a:latin typeface="Consolas" panose="020B0609020204030204" pitchFamily="49" charset="0"/>
+              </a:rPr>
+              <a:t>Here</a:t>
+            </a:r>
+          </a:p>
+          <a:p>
+            <a:r>
+              <a:rPr lang="en-US" b="0" dirty="0">
+                <a:solidFill>
+                  <a:schemeClr val="accent1"/>
+                </a:solidFill>
+                <a:effectLst/>
+                <a:latin typeface="Consolas" panose="020B0609020204030204" pitchFamily="49" charset="0"/>
+              </a:rPr>
+              <a:t>alpha = 0.4 </a:t>
+            </a:r>
+            <a:r>
+              <a:rPr lang="en-US" b="0" dirty="0">
+                <a:solidFill>
+                  <a:schemeClr val="bg1">
+                    <a:lumMod val="65000"/>
+                  </a:schemeClr>
+                </a:solidFill>
+                <a:effectLst/>
+                <a:latin typeface="Consolas" panose="020B0609020204030204" pitchFamily="49" charset="0"/>
+              </a:rPr>
+              <a:t>video length</a:t>
+            </a:r>
+          </a:p>
+          <a:p>
+            <a:r>
+              <a:rPr lang="en-US" b="0" dirty="0">
+                <a:solidFill>
+                  <a:schemeClr val="accent1"/>
+                </a:solidFill>
+                <a:effectLst/>
+                <a:latin typeface="Consolas" panose="020B0609020204030204" pitchFamily="49" charset="0"/>
+              </a:rPr>
+              <a:t>beta = 0.4  </a:t>
+            </a:r>
+            <a:r>
+              <a:rPr lang="en-US" b="0" dirty="0">
+                <a:solidFill>
+                  <a:schemeClr val="bg1">
+                    <a:lumMod val="65000"/>
+                  </a:schemeClr>
+                </a:solidFill>
+                <a:effectLst/>
+                <a:latin typeface="Consolas" panose="020B0609020204030204" pitchFamily="49" charset="0"/>
+              </a:rPr>
+              <a:t>video popularity</a:t>
+            </a:r>
+          </a:p>
+          <a:p>
+            <a:r>
+              <a:rPr lang="en-US" b="0" dirty="0">
+                <a:solidFill>
+                  <a:schemeClr val="accent1"/>
+                </a:solidFill>
+                <a:effectLst/>
+                <a:latin typeface="Consolas" panose="020B0609020204030204" pitchFamily="49" charset="0"/>
+              </a:rPr>
+              <a:t>gamma = 0.</a:t>
+            </a:r>
+            <a:r>
+              <a:rPr lang="en-US" dirty="0">
+                <a:solidFill>
+                  <a:schemeClr val="accent1"/>
+                </a:solidFill>
+                <a:latin typeface="Consolas" panose="020B0609020204030204" pitchFamily="49" charset="0"/>
+              </a:rPr>
+              <a:t>1</a:t>
+            </a:r>
+            <a:r>
+              <a:rPr lang="en-US" b="0" dirty="0">
+                <a:solidFill>
+                  <a:schemeClr val="accent1"/>
+                </a:solidFill>
+                <a:effectLst/>
+                <a:latin typeface="Consolas" panose="020B0609020204030204" pitchFamily="49" charset="0"/>
+              </a:rPr>
+              <a:t> </a:t>
+            </a:r>
+            <a:r>
+              <a:rPr lang="en-US" b="0" dirty="0">
+                <a:solidFill>
+                  <a:schemeClr val="bg1">
+                    <a:lumMod val="65000"/>
+                  </a:schemeClr>
+                </a:solidFill>
+                <a:effectLst/>
+                <a:latin typeface="Consolas" panose="020B0609020204030204" pitchFamily="49" charset="0"/>
+              </a:rPr>
+              <a:t>video alignment </a:t>
+            </a:r>
+            <a:r>
+              <a:rPr lang="en-US" b="0" dirty="0">
+                <a:solidFill>
+                  <a:schemeClr val="accent1"/>
+                </a:solidFill>
+                <a:effectLst/>
+                <a:latin typeface="Consolas" panose="020B0609020204030204" pitchFamily="49" charset="0"/>
+              </a:rPr>
+              <a:t>delta = 0.1 </a:t>
+            </a:r>
+            <a:r>
+              <a:rPr lang="en-US" b="0" dirty="0">
+                <a:solidFill>
+                  <a:schemeClr val="bg1">
+                    <a:lumMod val="65000"/>
+                  </a:schemeClr>
+                </a:solidFill>
+                <a:effectLst/>
+                <a:latin typeface="Consolas" panose="020B0609020204030204" pitchFamily="49" charset="0"/>
+              </a:rPr>
+              <a:t>video extremeness</a:t>
+            </a:r>
+          </a:p>
+          <a:p>
+            <a:r>
+              <a:rPr lang="en-US" b="1" dirty="0">
+                <a:solidFill>
+                  <a:schemeClr val="bg1">
+                    <a:lumMod val="65000"/>
+                  </a:schemeClr>
+                </a:solidFill>
+                <a:effectLst/>
+                <a:latin typeface="Consolas" panose="020B0609020204030204" pitchFamily="49" charset="0"/>
+              </a:rPr>
+              <a:t>Todo: Make sure delta rewards being at the extremes, not close to 1</a:t>
+            </a:r>
+          </a:p>
+        </p:txBody>
+      </p:sp>
+      <p:sp>
+        <p:nvSpPr>
+          <p:cNvPr id="8" name="TextBox 7">
+            <a:extLst>
+              <a:ext uri="{FF2B5EF4-FFF2-40B4-BE49-F238E27FC236}">
+                <a16:creationId xmlns:a16="http://schemas.microsoft.com/office/drawing/2014/main" id="{6295DB3C-5F35-A2A6-A887-F2EAF0833DD0}"/>
+              </a:ext>
+            </a:extLst>
+          </p:cNvPr>
+          <p:cNvSpPr txBox="1"/>
+          <p:nvPr/>
+        </p:nvSpPr>
+        <p:spPr>
+          <a:xfrm>
+            <a:off x="226956" y="2874556"/>
+            <a:ext cx="3857364" cy="1754326"/>
+          </a:xfrm>
+          <a:prstGeom prst="rect">
+            <a:avLst/>
+          </a:prstGeom>
+          <a:noFill/>
+        </p:spPr>
+        <p:txBody>
+          <a:bodyPr wrap="square">
+            <a:spAutoFit/>
+          </a:bodyPr>
+          <a:lstStyle/>
+          <a:p>
+            <a:r>
+              <a:rPr lang="en-US" b="0" dirty="0">
+                <a:solidFill>
+                  <a:schemeClr val="accent1">
+                    <a:lumMod val="50000"/>
+                  </a:schemeClr>
+                </a:solidFill>
+                <a:effectLst/>
+                <a:latin typeface="Consolas" panose="020B0609020204030204" pitchFamily="49" charset="0"/>
+              </a:rPr>
+              <a:t>Original</a:t>
+            </a:r>
+          </a:p>
+          <a:p>
+            <a:r>
+              <a:rPr lang="en-US" b="0" dirty="0">
+                <a:solidFill>
+                  <a:schemeClr val="accent1"/>
+                </a:solidFill>
+                <a:effectLst/>
+                <a:latin typeface="Consolas" panose="020B0609020204030204" pitchFamily="49" charset="0"/>
+              </a:rPr>
+              <a:t>alpha = 0.2 </a:t>
+            </a:r>
+            <a:r>
+              <a:rPr lang="en-US" b="0" dirty="0">
+                <a:solidFill>
+                  <a:schemeClr val="bg1">
+                    <a:lumMod val="65000"/>
+                  </a:schemeClr>
+                </a:solidFill>
+                <a:effectLst/>
+                <a:latin typeface="Consolas" panose="020B0609020204030204" pitchFamily="49" charset="0"/>
+              </a:rPr>
+              <a:t>video length</a:t>
+            </a:r>
+          </a:p>
+          <a:p>
+            <a:r>
+              <a:rPr lang="en-US" b="0" dirty="0">
+                <a:solidFill>
+                  <a:schemeClr val="accent1"/>
+                </a:solidFill>
+                <a:effectLst/>
+                <a:latin typeface="Consolas" panose="020B0609020204030204" pitchFamily="49" charset="0"/>
+              </a:rPr>
+              <a:t>beta = 0.15  </a:t>
+            </a:r>
+            <a:r>
+              <a:rPr lang="en-US" b="0" dirty="0">
+                <a:solidFill>
+                  <a:schemeClr val="bg1">
+                    <a:lumMod val="65000"/>
+                  </a:schemeClr>
+                </a:solidFill>
+                <a:effectLst/>
+                <a:latin typeface="Consolas" panose="020B0609020204030204" pitchFamily="49" charset="0"/>
+              </a:rPr>
+              <a:t>video popularity</a:t>
+            </a:r>
+          </a:p>
+          <a:p>
+            <a:r>
+              <a:rPr lang="en-US" b="0" dirty="0">
+                <a:solidFill>
+                  <a:schemeClr val="accent1"/>
+                </a:solidFill>
+                <a:effectLst/>
+                <a:latin typeface="Consolas" panose="020B0609020204030204" pitchFamily="49" charset="0"/>
+              </a:rPr>
+              <a:t>gamma = 0.5 </a:t>
+            </a:r>
+            <a:r>
+              <a:rPr lang="en-US" b="0" dirty="0">
+                <a:solidFill>
+                  <a:schemeClr val="bg1">
+                    <a:lumMod val="65000"/>
+                  </a:schemeClr>
+                </a:solidFill>
+                <a:effectLst/>
+                <a:latin typeface="Consolas" panose="020B0609020204030204" pitchFamily="49" charset="0"/>
+              </a:rPr>
+              <a:t>video alignment </a:t>
+            </a:r>
+            <a:r>
+              <a:rPr lang="en-US" b="0" dirty="0">
+                <a:solidFill>
+                  <a:schemeClr val="accent1"/>
+                </a:solidFill>
+                <a:effectLst/>
+                <a:latin typeface="Consolas" panose="020B0609020204030204" pitchFamily="49" charset="0"/>
+              </a:rPr>
+              <a:t>delta = 0.15 </a:t>
+            </a:r>
+            <a:r>
+              <a:rPr lang="en-US" b="0" dirty="0">
+                <a:solidFill>
+                  <a:schemeClr val="bg1">
+                    <a:lumMod val="65000"/>
+                  </a:schemeClr>
+                </a:solidFill>
+                <a:effectLst/>
+                <a:latin typeface="Consolas" panose="020B0609020204030204" pitchFamily="49" charset="0"/>
+              </a:rPr>
+              <a:t>video extremeness</a:t>
+            </a:r>
+          </a:p>
+        </p:txBody>
+      </p:sp>
+    </p:spTree>
+    <p:extLst>
+      <p:ext uri="{BB962C8B-B14F-4D97-AF65-F5344CB8AC3E}">
+        <p14:creationId xmlns:p14="http://schemas.microsoft.com/office/powerpoint/2010/main" val="3690379471"/>
+      </p:ext>
+    </p:extLst>
+  </p:cSld>
+  <p:clrMapOvr>
+    <a:masterClrMapping/>
+  </p:clrMapOvr>
+</p:sld>
+</file>
+
+<file path=ppt/slides/slide34.xml><?xml version="1.0" encoding="utf-8"?>
+<p:sld xmlns:a="http://schemas.openxmlformats.org/drawingml/2006/main" xmlns:r="http://schemas.openxmlformats.org/officeDocument/2006/relationships" xmlns:p="http://schemas.openxmlformats.org/presentationml/2006/main">
+  <p:cSld>
+    <p:spTree>
+      <p:nvGrpSpPr>
+        <p:cNvPr id="1" name="">
+          <a:extLst>
+            <a:ext uri="{FF2B5EF4-FFF2-40B4-BE49-F238E27FC236}">
+              <a16:creationId xmlns:a16="http://schemas.microsoft.com/office/drawing/2014/main" id="{F05642A5-7133-B2A3-08E7-6B61AC35935A}"/>
+            </a:ext>
+          </a:extLst>
+        </p:cNvPr>
+        <p:cNvGrpSpPr/>
+        <p:nvPr/>
+      </p:nvGrpSpPr>
+      <p:grpSpPr>
+        <a:xfrm>
+          <a:off x="0" y="0"/>
+          <a:ext cx="0" cy="0"/>
+          <a:chOff x="0" y="0"/>
+          <a:chExt cx="0" cy="0"/>
+        </a:xfrm>
+      </p:grpSpPr>
+      <p:sp>
+        <p:nvSpPr>
+          <p:cNvPr id="2" name="Title 1">
+            <a:extLst>
+              <a:ext uri="{FF2B5EF4-FFF2-40B4-BE49-F238E27FC236}">
+                <a16:creationId xmlns:a16="http://schemas.microsoft.com/office/drawing/2014/main" id="{E5C18FC5-6C37-3319-ABEB-B82193ECA69F}"/>
+              </a:ext>
+            </a:extLst>
+          </p:cNvPr>
+          <p:cNvSpPr>
+            <a:spLocks noGrp="1"/>
+          </p:cNvSpPr>
+          <p:nvPr>
+            <p:ph type="title"/>
+          </p:nvPr>
+        </p:nvSpPr>
+        <p:spPr>
+          <a:xfrm>
+            <a:off x="590723" y="-66503"/>
+            <a:ext cx="10772775" cy="1658198"/>
+          </a:xfrm>
+        </p:spPr>
+        <p:txBody>
+          <a:bodyPr/>
+          <a:lstStyle/>
+          <a:p>
+            <a:r>
+              <a:rPr lang="en-US" dirty="0"/>
+              <a:t>Continuing on This Particular Scenario</a:t>
+            </a:r>
+            <a:br>
+              <a:rPr lang="en-US" dirty="0"/>
+            </a:br>
+            <a:r>
+              <a:rPr lang="en-US" sz="2000" i="1" dirty="0"/>
+              <a:t>(goal: try and loosen the restrictions to avoid the step-function-looking result.)</a:t>
+            </a:r>
+            <a:endParaRPr lang="en-US" dirty="0"/>
+          </a:p>
+        </p:txBody>
+      </p:sp>
+      <p:sp>
+        <p:nvSpPr>
+          <p:cNvPr id="6" name="TextBox 5">
+            <a:extLst>
+              <a:ext uri="{FF2B5EF4-FFF2-40B4-BE49-F238E27FC236}">
+                <a16:creationId xmlns:a16="http://schemas.microsoft.com/office/drawing/2014/main" id="{D771FF45-385C-1CCE-DD18-1772992E8AE3}"/>
+              </a:ext>
+            </a:extLst>
+          </p:cNvPr>
+          <p:cNvSpPr txBox="1"/>
+          <p:nvPr/>
+        </p:nvSpPr>
+        <p:spPr>
+          <a:xfrm>
+            <a:off x="226956" y="4886467"/>
+            <a:ext cx="3995909" cy="1477328"/>
+          </a:xfrm>
+          <a:prstGeom prst="rect">
+            <a:avLst/>
+          </a:prstGeom>
+          <a:noFill/>
+        </p:spPr>
+        <p:txBody>
+          <a:bodyPr wrap="square">
+            <a:spAutoFit/>
+          </a:bodyPr>
+          <a:lstStyle/>
+          <a:p>
+            <a:r>
+              <a:rPr lang="en-US" b="0" dirty="0">
+                <a:solidFill>
+                  <a:schemeClr val="accent1">
+                    <a:lumMod val="50000"/>
+                  </a:schemeClr>
+                </a:solidFill>
+                <a:effectLst/>
+                <a:latin typeface="Consolas" panose="020B0609020204030204" pitchFamily="49" charset="0"/>
+              </a:rPr>
+              <a:t>Here</a:t>
+            </a:r>
+          </a:p>
+          <a:p>
+            <a:r>
+              <a:rPr lang="en-US" b="0" dirty="0">
+                <a:solidFill>
+                  <a:schemeClr val="accent1"/>
+                </a:solidFill>
+                <a:effectLst/>
+                <a:latin typeface="Consolas" panose="020B0609020204030204" pitchFamily="49" charset="0"/>
+              </a:rPr>
+              <a:t>alpha = 0.4 </a:t>
+            </a:r>
+            <a:r>
+              <a:rPr lang="en-US" b="0" dirty="0">
+                <a:solidFill>
+                  <a:schemeClr val="bg1">
+                    <a:lumMod val="65000"/>
+                  </a:schemeClr>
+                </a:solidFill>
+                <a:effectLst/>
+                <a:latin typeface="Consolas" panose="020B0609020204030204" pitchFamily="49" charset="0"/>
+              </a:rPr>
+              <a:t>video length</a:t>
+            </a:r>
+          </a:p>
+          <a:p>
+            <a:r>
+              <a:rPr lang="en-US" b="0" dirty="0">
+                <a:solidFill>
+                  <a:schemeClr val="accent1"/>
+                </a:solidFill>
+                <a:effectLst/>
+                <a:latin typeface="Consolas" panose="020B0609020204030204" pitchFamily="49" charset="0"/>
+              </a:rPr>
+              <a:t>beta = 0.4  </a:t>
+            </a:r>
+            <a:r>
+              <a:rPr lang="en-US" b="0" dirty="0">
+                <a:solidFill>
+                  <a:schemeClr val="bg1">
+                    <a:lumMod val="65000"/>
+                  </a:schemeClr>
+                </a:solidFill>
+                <a:effectLst/>
+                <a:latin typeface="Consolas" panose="020B0609020204030204" pitchFamily="49" charset="0"/>
+              </a:rPr>
+              <a:t>video popularity</a:t>
+            </a:r>
+          </a:p>
+          <a:p>
+            <a:r>
+              <a:rPr lang="en-US" b="0" dirty="0">
+                <a:solidFill>
+                  <a:schemeClr val="accent1"/>
+                </a:solidFill>
+                <a:effectLst/>
+                <a:latin typeface="Consolas" panose="020B0609020204030204" pitchFamily="49" charset="0"/>
+              </a:rPr>
+              <a:t>gamma = 0.</a:t>
+            </a:r>
+            <a:r>
+              <a:rPr lang="en-US" dirty="0">
+                <a:solidFill>
+                  <a:schemeClr val="accent1"/>
+                </a:solidFill>
+                <a:latin typeface="Consolas" panose="020B0609020204030204" pitchFamily="49" charset="0"/>
+              </a:rPr>
+              <a:t>1</a:t>
+            </a:r>
+            <a:r>
+              <a:rPr lang="en-US" b="0" dirty="0">
+                <a:solidFill>
+                  <a:schemeClr val="accent1"/>
+                </a:solidFill>
+                <a:effectLst/>
+                <a:latin typeface="Consolas" panose="020B0609020204030204" pitchFamily="49" charset="0"/>
+              </a:rPr>
+              <a:t> </a:t>
+            </a:r>
+            <a:r>
+              <a:rPr lang="en-US" b="0" dirty="0">
+                <a:solidFill>
+                  <a:schemeClr val="bg1">
+                    <a:lumMod val="65000"/>
+                  </a:schemeClr>
+                </a:solidFill>
+                <a:effectLst/>
+                <a:latin typeface="Consolas" panose="020B0609020204030204" pitchFamily="49" charset="0"/>
+              </a:rPr>
+              <a:t>video alignment </a:t>
+            </a:r>
+            <a:r>
+              <a:rPr lang="en-US" b="0" dirty="0">
+                <a:solidFill>
+                  <a:schemeClr val="accent1"/>
+                </a:solidFill>
+                <a:effectLst/>
+                <a:latin typeface="Consolas" panose="020B0609020204030204" pitchFamily="49" charset="0"/>
+              </a:rPr>
+              <a:t>delta = 0.1 </a:t>
+            </a:r>
+            <a:r>
+              <a:rPr lang="en-US" b="0" dirty="0">
+                <a:solidFill>
+                  <a:schemeClr val="bg1">
+                    <a:lumMod val="65000"/>
+                  </a:schemeClr>
+                </a:solidFill>
+                <a:effectLst/>
+                <a:latin typeface="Consolas" panose="020B0609020204030204" pitchFamily="49" charset="0"/>
+              </a:rPr>
+              <a:t>video extremeness</a:t>
+            </a:r>
+          </a:p>
+        </p:txBody>
+      </p:sp>
+      <p:sp>
+        <p:nvSpPr>
+          <p:cNvPr id="8" name="TextBox 7">
+            <a:extLst>
+              <a:ext uri="{FF2B5EF4-FFF2-40B4-BE49-F238E27FC236}">
+                <a16:creationId xmlns:a16="http://schemas.microsoft.com/office/drawing/2014/main" id="{C7EDF48C-5947-92F6-B214-A834E2DDB05E}"/>
+              </a:ext>
+            </a:extLst>
+          </p:cNvPr>
+          <p:cNvSpPr txBox="1"/>
+          <p:nvPr/>
+        </p:nvSpPr>
+        <p:spPr>
+          <a:xfrm>
+            <a:off x="2842694" y="1470147"/>
+            <a:ext cx="3857364" cy="3416320"/>
+          </a:xfrm>
+          <a:prstGeom prst="rect">
+            <a:avLst/>
+          </a:prstGeom>
+          <a:noFill/>
+        </p:spPr>
+        <p:txBody>
+          <a:bodyPr wrap="square">
+            <a:spAutoFit/>
+          </a:bodyPr>
+          <a:lstStyle/>
+          <a:p>
+            <a:r>
+              <a:rPr lang="en-US" b="0" dirty="0">
+                <a:solidFill>
+                  <a:schemeClr val="accent1">
+                    <a:lumMod val="50000"/>
+                  </a:schemeClr>
+                </a:solidFill>
+                <a:effectLst/>
+                <a:latin typeface="Consolas" panose="020B0609020204030204" pitchFamily="49" charset="0"/>
+              </a:rPr>
+              <a:t>The same pattern of watching </a:t>
+            </a:r>
+            <a:r>
+              <a:rPr lang="en-US" b="0" u="sng" dirty="0">
+                <a:solidFill>
+                  <a:schemeClr val="accent1">
+                    <a:lumMod val="50000"/>
+                  </a:schemeClr>
+                </a:solidFill>
+                <a:effectLst/>
+                <a:latin typeface="Consolas" panose="020B0609020204030204" pitchFamily="49" charset="0"/>
+              </a:rPr>
+              <a:t>less minutes</a:t>
+            </a:r>
+            <a:r>
+              <a:rPr lang="en-US" b="0" dirty="0">
+                <a:solidFill>
+                  <a:schemeClr val="accent1">
+                    <a:lumMod val="50000"/>
+                  </a:schemeClr>
+                </a:solidFill>
+                <a:effectLst/>
+                <a:latin typeface="Consolas" panose="020B0609020204030204" pitchFamily="49" charset="0"/>
+              </a:rPr>
+              <a:t>, but a </a:t>
+            </a:r>
+            <a:r>
+              <a:rPr lang="en-US" b="0" u="sng" dirty="0">
+                <a:solidFill>
+                  <a:schemeClr val="accent1">
+                    <a:lumMod val="50000"/>
+                  </a:schemeClr>
+                </a:solidFill>
+                <a:effectLst/>
+                <a:latin typeface="Consolas" panose="020B0609020204030204" pitchFamily="49" charset="0"/>
+              </a:rPr>
+              <a:t>higher number of videos</a:t>
+            </a:r>
+            <a:r>
+              <a:rPr lang="en-US" b="0" dirty="0">
+                <a:solidFill>
+                  <a:schemeClr val="accent1">
+                    <a:lumMod val="50000"/>
+                  </a:schemeClr>
+                </a:solidFill>
+                <a:effectLst/>
+                <a:latin typeface="Consolas" panose="020B0609020204030204" pitchFamily="49" charset="0"/>
+              </a:rPr>
+              <a:t>, continues here, even with a much larger emphasis on video length (and popularity).</a:t>
+            </a:r>
+          </a:p>
+          <a:p>
+            <a:r>
+              <a:rPr lang="en-US" dirty="0">
+                <a:solidFill>
+                  <a:schemeClr val="accent1">
+                    <a:lumMod val="50000"/>
+                  </a:schemeClr>
+                </a:solidFill>
+                <a:latin typeface="Consolas" panose="020B0609020204030204" pitchFamily="49" charset="0"/>
+              </a:rPr>
+              <a:t>Todo: in the top graph, the light blue line should theoretically be about the same because users are watching until their time limit is exhausted</a:t>
+            </a:r>
+            <a:endParaRPr lang="en-US" b="0" dirty="0">
+              <a:solidFill>
+                <a:schemeClr val="bg1">
+                  <a:lumMod val="65000"/>
+                </a:schemeClr>
+              </a:solidFill>
+              <a:effectLst/>
+              <a:latin typeface="Consolas" panose="020B0609020204030204" pitchFamily="49" charset="0"/>
+            </a:endParaRPr>
+          </a:p>
+        </p:txBody>
+      </p:sp>
+      <p:pic>
+        <p:nvPicPr>
+          <p:cNvPr id="11" name="Picture 10">
+            <a:extLst>
+              <a:ext uri="{FF2B5EF4-FFF2-40B4-BE49-F238E27FC236}">
+                <a16:creationId xmlns:a16="http://schemas.microsoft.com/office/drawing/2014/main" id="{8F3B296D-588B-4812-8D5F-2F2FAE9998C2}"/>
+              </a:ext>
+            </a:extLst>
+          </p:cNvPr>
+          <p:cNvPicPr>
+            <a:picLocks noChangeAspect="1"/>
+          </p:cNvPicPr>
+          <p:nvPr/>
+        </p:nvPicPr>
+        <p:blipFill>
+          <a:blip r:embed="rId2"/>
+          <a:stretch>
+            <a:fillRect/>
+          </a:stretch>
+        </p:blipFill>
+        <p:spPr>
+          <a:xfrm>
+            <a:off x="8322779" y="1006101"/>
+            <a:ext cx="3468139" cy="2744570"/>
+          </a:xfrm>
+          <a:prstGeom prst="rect">
+            <a:avLst/>
+          </a:prstGeom>
+        </p:spPr>
+      </p:pic>
+      <p:pic>
+        <p:nvPicPr>
+          <p:cNvPr id="13" name="Picture 12">
+            <a:extLst>
+              <a:ext uri="{FF2B5EF4-FFF2-40B4-BE49-F238E27FC236}">
+                <a16:creationId xmlns:a16="http://schemas.microsoft.com/office/drawing/2014/main" id="{D634BE9D-1D1A-08F6-6A82-8D03C231DB18}"/>
+              </a:ext>
+            </a:extLst>
+          </p:cNvPr>
+          <p:cNvPicPr>
+            <a:picLocks noChangeAspect="1"/>
+          </p:cNvPicPr>
+          <p:nvPr/>
+        </p:nvPicPr>
+        <p:blipFill>
+          <a:blip r:embed="rId3"/>
+          <a:stretch>
+            <a:fillRect/>
+          </a:stretch>
+        </p:blipFill>
+        <p:spPr>
+          <a:xfrm>
+            <a:off x="8314465" y="3823855"/>
+            <a:ext cx="3577244" cy="2830913"/>
+          </a:xfrm>
+          <a:prstGeom prst="rect">
+            <a:avLst/>
+          </a:prstGeom>
+        </p:spPr>
+      </p:pic>
+    </p:spTree>
+    <p:extLst>
+      <p:ext uri="{BB962C8B-B14F-4D97-AF65-F5344CB8AC3E}">
+        <p14:creationId xmlns:p14="http://schemas.microsoft.com/office/powerpoint/2010/main" val="834804995"/>
+      </p:ext>
+    </p:extLst>
+  </p:cSld>
+  <p:clrMapOvr>
+    <a:masterClrMapping/>
+  </p:clrMapOvr>
+</p:sld>
+</file>
+
+<file path=ppt/slides/slide35.xml><?xml version="1.0" encoding="utf-8"?>
+<p:sld xmlns:a="http://schemas.openxmlformats.org/drawingml/2006/main" xmlns:r="http://schemas.openxmlformats.org/officeDocument/2006/relationships" xmlns:p="http://schemas.openxmlformats.org/presentationml/2006/main">
+  <p:cSld>
+    <p:spTree>
+      <p:nvGrpSpPr>
+        <p:cNvPr id="1" name="">
+          <a:extLst>
+            <a:ext uri="{FF2B5EF4-FFF2-40B4-BE49-F238E27FC236}">
+              <a16:creationId xmlns:a16="http://schemas.microsoft.com/office/drawing/2014/main" id="{CC129946-ADEB-06E5-5BBC-1C76C53EBC64}"/>
+            </a:ext>
+          </a:extLst>
+        </p:cNvPr>
+        <p:cNvGrpSpPr/>
+        <p:nvPr/>
+      </p:nvGrpSpPr>
+      <p:grpSpPr>
+        <a:xfrm>
+          <a:off x="0" y="0"/>
+          <a:ext cx="0" cy="0"/>
+          <a:chOff x="0" y="0"/>
+          <a:chExt cx="0" cy="0"/>
+        </a:xfrm>
+      </p:grpSpPr>
+      <p:pic>
+        <p:nvPicPr>
+          <p:cNvPr id="5" name="Picture 4">
+            <a:extLst>
+              <a:ext uri="{FF2B5EF4-FFF2-40B4-BE49-F238E27FC236}">
+                <a16:creationId xmlns:a16="http://schemas.microsoft.com/office/drawing/2014/main" id="{D793A24A-3896-E96F-58AD-9E71D70DB25D}"/>
+              </a:ext>
+            </a:extLst>
+          </p:cNvPr>
+          <p:cNvPicPr>
+            <a:picLocks noChangeAspect="1"/>
+          </p:cNvPicPr>
+          <p:nvPr/>
+        </p:nvPicPr>
+        <p:blipFill>
+          <a:blip r:embed="rId2"/>
+          <a:stretch>
+            <a:fillRect/>
+          </a:stretch>
+        </p:blipFill>
+        <p:spPr>
+          <a:xfrm>
+            <a:off x="3642889" y="1731137"/>
+            <a:ext cx="8405284" cy="4026997"/>
+          </a:xfrm>
+          <a:prstGeom prst="rect">
+            <a:avLst/>
+          </a:prstGeom>
+        </p:spPr>
+      </p:pic>
+      <p:sp>
+        <p:nvSpPr>
+          <p:cNvPr id="2" name="Title 1">
+            <a:extLst>
+              <a:ext uri="{FF2B5EF4-FFF2-40B4-BE49-F238E27FC236}">
+                <a16:creationId xmlns:a16="http://schemas.microsoft.com/office/drawing/2014/main" id="{D8E21522-23C2-2CC2-B394-8536C409CDA7}"/>
+              </a:ext>
+            </a:extLst>
+          </p:cNvPr>
+          <p:cNvSpPr>
+            <a:spLocks noGrp="1"/>
+          </p:cNvSpPr>
+          <p:nvPr>
+            <p:ph type="title"/>
+          </p:nvPr>
+        </p:nvSpPr>
+        <p:spPr>
+          <a:xfrm>
+            <a:off x="590723" y="-66503"/>
+            <a:ext cx="10772775" cy="1658198"/>
+          </a:xfrm>
+        </p:spPr>
+        <p:txBody>
+          <a:bodyPr/>
+          <a:lstStyle/>
+          <a:p>
+            <a:r>
+              <a:rPr lang="en-US" dirty="0"/>
+              <a:t>Expanding on the Last Slide</a:t>
+            </a:r>
+            <a:br>
+              <a:rPr lang="en-US" dirty="0"/>
+            </a:br>
+            <a:r>
+              <a:rPr lang="en-US" sz="2000" i="1" dirty="0"/>
+              <a:t>What if we really bump the influence of video length?</a:t>
+            </a:r>
+            <a:endParaRPr lang="en-US" dirty="0"/>
+          </a:p>
+        </p:txBody>
+      </p:sp>
+      <p:sp>
+        <p:nvSpPr>
+          <p:cNvPr id="6" name="TextBox 5">
+            <a:extLst>
+              <a:ext uri="{FF2B5EF4-FFF2-40B4-BE49-F238E27FC236}">
+                <a16:creationId xmlns:a16="http://schemas.microsoft.com/office/drawing/2014/main" id="{5339067F-D64A-1FA2-CA73-648CE42E21B4}"/>
+              </a:ext>
+            </a:extLst>
+          </p:cNvPr>
+          <p:cNvSpPr txBox="1"/>
+          <p:nvPr/>
+        </p:nvSpPr>
+        <p:spPr>
+          <a:xfrm>
+            <a:off x="226956" y="4886467"/>
+            <a:ext cx="3995909" cy="1477328"/>
+          </a:xfrm>
+          <a:prstGeom prst="rect">
+            <a:avLst/>
+          </a:prstGeom>
+          <a:noFill/>
+        </p:spPr>
+        <p:txBody>
+          <a:bodyPr wrap="square">
+            <a:spAutoFit/>
+          </a:bodyPr>
+          <a:lstStyle/>
+          <a:p>
+            <a:r>
+              <a:rPr lang="en-US" b="0" dirty="0">
+                <a:solidFill>
+                  <a:schemeClr val="accent1">
+                    <a:lumMod val="50000"/>
+                  </a:schemeClr>
+                </a:solidFill>
+                <a:effectLst/>
+                <a:latin typeface="Consolas" panose="020B0609020204030204" pitchFamily="49" charset="0"/>
+              </a:rPr>
+              <a:t>Here</a:t>
+            </a:r>
+          </a:p>
+          <a:p>
+            <a:r>
+              <a:rPr lang="en-US" b="1" dirty="0">
+                <a:solidFill>
+                  <a:schemeClr val="accent1"/>
+                </a:solidFill>
+                <a:effectLst/>
+                <a:latin typeface="Consolas" panose="020B0609020204030204" pitchFamily="49" charset="0"/>
+              </a:rPr>
+              <a:t>alpha = 0.7 </a:t>
+            </a:r>
+            <a:r>
+              <a:rPr lang="en-US" b="0" dirty="0">
+                <a:solidFill>
+                  <a:schemeClr val="bg1">
+                    <a:lumMod val="65000"/>
+                  </a:schemeClr>
+                </a:solidFill>
+                <a:effectLst/>
+                <a:latin typeface="Consolas" panose="020B0609020204030204" pitchFamily="49" charset="0"/>
+              </a:rPr>
+              <a:t>video length</a:t>
+            </a:r>
+          </a:p>
+          <a:p>
+            <a:r>
+              <a:rPr lang="en-US" b="0" dirty="0">
+                <a:solidFill>
+                  <a:schemeClr val="accent1"/>
+                </a:solidFill>
+                <a:effectLst/>
+                <a:latin typeface="Consolas" panose="020B0609020204030204" pitchFamily="49" charset="0"/>
+              </a:rPr>
+              <a:t>beta = 0.1  </a:t>
+            </a:r>
+            <a:r>
+              <a:rPr lang="en-US" b="0" dirty="0">
+                <a:solidFill>
+                  <a:schemeClr val="bg1">
+                    <a:lumMod val="65000"/>
+                  </a:schemeClr>
+                </a:solidFill>
+                <a:effectLst/>
+                <a:latin typeface="Consolas" panose="020B0609020204030204" pitchFamily="49" charset="0"/>
+              </a:rPr>
+              <a:t>video popularity</a:t>
+            </a:r>
+          </a:p>
+          <a:p>
+            <a:r>
+              <a:rPr lang="en-US" b="0" dirty="0">
+                <a:solidFill>
+                  <a:schemeClr val="accent1"/>
+                </a:solidFill>
+                <a:effectLst/>
+                <a:latin typeface="Consolas" panose="020B0609020204030204" pitchFamily="49" charset="0"/>
+              </a:rPr>
+              <a:t>gamma = 0.</a:t>
+            </a:r>
+            <a:r>
+              <a:rPr lang="en-US" dirty="0">
+                <a:solidFill>
+                  <a:schemeClr val="accent1"/>
+                </a:solidFill>
+                <a:latin typeface="Consolas" panose="020B0609020204030204" pitchFamily="49" charset="0"/>
+              </a:rPr>
+              <a:t>1</a:t>
+            </a:r>
+            <a:r>
+              <a:rPr lang="en-US" b="0" dirty="0">
+                <a:solidFill>
+                  <a:schemeClr val="accent1"/>
+                </a:solidFill>
+                <a:effectLst/>
+                <a:latin typeface="Consolas" panose="020B0609020204030204" pitchFamily="49" charset="0"/>
+              </a:rPr>
+              <a:t> </a:t>
+            </a:r>
+            <a:r>
+              <a:rPr lang="en-US" b="0" dirty="0">
+                <a:solidFill>
+                  <a:schemeClr val="bg1">
+                    <a:lumMod val="65000"/>
+                  </a:schemeClr>
+                </a:solidFill>
+                <a:effectLst/>
+                <a:latin typeface="Consolas" panose="020B0609020204030204" pitchFamily="49" charset="0"/>
+              </a:rPr>
+              <a:t>video alignment </a:t>
+            </a:r>
+            <a:r>
+              <a:rPr lang="en-US" b="0" dirty="0">
+                <a:solidFill>
+                  <a:schemeClr val="accent1"/>
+                </a:solidFill>
+                <a:effectLst/>
+                <a:latin typeface="Consolas" panose="020B0609020204030204" pitchFamily="49" charset="0"/>
+              </a:rPr>
+              <a:t>delta = 0.1 </a:t>
+            </a:r>
+            <a:r>
+              <a:rPr lang="en-US" b="0" dirty="0">
+                <a:solidFill>
+                  <a:schemeClr val="bg1">
+                    <a:lumMod val="65000"/>
+                  </a:schemeClr>
+                </a:solidFill>
+                <a:effectLst/>
+                <a:latin typeface="Consolas" panose="020B0609020204030204" pitchFamily="49" charset="0"/>
+              </a:rPr>
+              <a:t>video extremeness</a:t>
+            </a:r>
+          </a:p>
+        </p:txBody>
+      </p:sp>
+      <p:sp>
+        <p:nvSpPr>
+          <p:cNvPr id="8" name="TextBox 7">
+            <a:extLst>
+              <a:ext uri="{FF2B5EF4-FFF2-40B4-BE49-F238E27FC236}">
+                <a16:creationId xmlns:a16="http://schemas.microsoft.com/office/drawing/2014/main" id="{EDFA7B2E-6302-347F-38ED-A0CC73ED9237}"/>
+              </a:ext>
+            </a:extLst>
+          </p:cNvPr>
+          <p:cNvSpPr txBox="1"/>
+          <p:nvPr/>
+        </p:nvSpPr>
+        <p:spPr>
+          <a:xfrm>
+            <a:off x="226956" y="2874556"/>
+            <a:ext cx="3857364" cy="1477328"/>
+          </a:xfrm>
+          <a:prstGeom prst="rect">
+            <a:avLst/>
+          </a:prstGeom>
+          <a:noFill/>
+        </p:spPr>
+        <p:txBody>
+          <a:bodyPr wrap="square">
+            <a:spAutoFit/>
+          </a:bodyPr>
+          <a:lstStyle/>
+          <a:p>
+            <a:r>
+              <a:rPr lang="en-US" b="0" dirty="0">
+                <a:solidFill>
+                  <a:schemeClr val="accent1">
+                    <a:lumMod val="50000"/>
+                  </a:schemeClr>
+                </a:solidFill>
+                <a:effectLst/>
+                <a:latin typeface="Consolas" panose="020B0609020204030204" pitchFamily="49" charset="0"/>
+              </a:rPr>
+              <a:t>The baseline extremeness shifts---in this scenario, it means the average video watched is more right-wing.</a:t>
+            </a:r>
+          </a:p>
+          <a:p>
+            <a:r>
+              <a:rPr lang="en-US" i="1" dirty="0">
+                <a:solidFill>
+                  <a:schemeClr val="accent1">
+                    <a:lumMod val="50000"/>
+                  </a:schemeClr>
+                </a:solidFill>
+                <a:latin typeface="Consolas" panose="020B0609020204030204" pitchFamily="49" charset="0"/>
+              </a:rPr>
+              <a:t>Why?</a:t>
+            </a:r>
+            <a:r>
+              <a:rPr lang="en-US" dirty="0">
+                <a:solidFill>
+                  <a:schemeClr val="accent1">
+                    <a:lumMod val="50000"/>
+                  </a:schemeClr>
+                </a:solidFill>
+                <a:latin typeface="Consolas" panose="020B0609020204030204" pitchFamily="49" charset="0"/>
+              </a:rPr>
+              <a:t> I’m unsure.</a:t>
+            </a:r>
+            <a:endParaRPr lang="en-US" b="0" i="1" dirty="0">
+              <a:solidFill>
+                <a:schemeClr val="bg1">
+                  <a:lumMod val="65000"/>
+                </a:schemeClr>
+              </a:solidFill>
+              <a:effectLst/>
+              <a:latin typeface="Consolas" panose="020B0609020204030204" pitchFamily="49" charset="0"/>
+            </a:endParaRPr>
+          </a:p>
+        </p:txBody>
+      </p:sp>
+    </p:spTree>
+    <p:extLst>
+      <p:ext uri="{BB962C8B-B14F-4D97-AF65-F5344CB8AC3E}">
+        <p14:creationId xmlns:p14="http://schemas.microsoft.com/office/powerpoint/2010/main" val="735389630"/>
+      </p:ext>
+    </p:extLst>
+  </p:cSld>
+  <p:clrMapOvr>
+    <a:masterClrMapping/>
+  </p:clrMapOvr>
+</p:sld>
+</file>
+
+<file path=ppt/slides/slide36.xml><?xml version="1.0" encoding="utf-8"?>
+<p:sld xmlns:a="http://schemas.openxmlformats.org/drawingml/2006/main" xmlns:r="http://schemas.openxmlformats.org/officeDocument/2006/relationships" xmlns:p="http://schemas.openxmlformats.org/presentationml/2006/main">
+  <p:cSld>
+    <p:spTree>
+      <p:nvGrpSpPr>
+        <p:cNvPr id="1" name="">
+          <a:extLst>
+            <a:ext uri="{FF2B5EF4-FFF2-40B4-BE49-F238E27FC236}">
+              <a16:creationId xmlns:a16="http://schemas.microsoft.com/office/drawing/2014/main" id="{BA2FBD62-F269-C7E5-50E8-6443B71B86F4}"/>
+            </a:ext>
+          </a:extLst>
+        </p:cNvPr>
+        <p:cNvGrpSpPr/>
+        <p:nvPr/>
+      </p:nvGrpSpPr>
+      <p:grpSpPr>
+        <a:xfrm>
+          <a:off x="0" y="0"/>
+          <a:ext cx="0" cy="0"/>
+          <a:chOff x="0" y="0"/>
+          <a:chExt cx="0" cy="0"/>
+        </a:xfrm>
+      </p:grpSpPr>
+      <p:sp>
+        <p:nvSpPr>
+          <p:cNvPr id="2" name="Title 1">
+            <a:extLst>
+              <a:ext uri="{FF2B5EF4-FFF2-40B4-BE49-F238E27FC236}">
+                <a16:creationId xmlns:a16="http://schemas.microsoft.com/office/drawing/2014/main" id="{E2EA5A5B-2FF8-B66E-400C-1525DCDA84BF}"/>
+              </a:ext>
+            </a:extLst>
+          </p:cNvPr>
+          <p:cNvSpPr>
+            <a:spLocks noGrp="1"/>
+          </p:cNvSpPr>
+          <p:nvPr>
+            <p:ph type="title"/>
+          </p:nvPr>
+        </p:nvSpPr>
+        <p:spPr>
+          <a:xfrm>
+            <a:off x="590723" y="-66503"/>
+            <a:ext cx="10772775" cy="1658198"/>
+          </a:xfrm>
+        </p:spPr>
+        <p:txBody>
+          <a:bodyPr/>
+          <a:lstStyle/>
+          <a:p>
+            <a:r>
+              <a:rPr lang="en-US" dirty="0"/>
+              <a:t>Expanding on the Last Slide</a:t>
+            </a:r>
+            <a:br>
+              <a:rPr lang="en-US" dirty="0"/>
+            </a:br>
+            <a:r>
+              <a:rPr lang="en-US" sz="2000" i="1" dirty="0"/>
+              <a:t>What if we really bump the influence of video length?</a:t>
+            </a:r>
+            <a:endParaRPr lang="en-US" dirty="0"/>
+          </a:p>
+        </p:txBody>
+      </p:sp>
+      <p:sp>
+        <p:nvSpPr>
+          <p:cNvPr id="6" name="TextBox 5">
+            <a:extLst>
+              <a:ext uri="{FF2B5EF4-FFF2-40B4-BE49-F238E27FC236}">
+                <a16:creationId xmlns:a16="http://schemas.microsoft.com/office/drawing/2014/main" id="{FF0FABDA-4623-91BE-F502-AA79DF1532B7}"/>
+              </a:ext>
+            </a:extLst>
+          </p:cNvPr>
+          <p:cNvSpPr txBox="1"/>
+          <p:nvPr/>
+        </p:nvSpPr>
+        <p:spPr>
+          <a:xfrm>
+            <a:off x="226956" y="4886467"/>
+            <a:ext cx="3995909" cy="1477328"/>
+          </a:xfrm>
+          <a:prstGeom prst="rect">
+            <a:avLst/>
+          </a:prstGeom>
+          <a:noFill/>
+        </p:spPr>
+        <p:txBody>
+          <a:bodyPr wrap="square">
+            <a:spAutoFit/>
+          </a:bodyPr>
+          <a:lstStyle/>
+          <a:p>
+            <a:r>
+              <a:rPr lang="en-US" b="0" dirty="0">
+                <a:solidFill>
+                  <a:schemeClr val="accent1">
+                    <a:lumMod val="50000"/>
+                  </a:schemeClr>
+                </a:solidFill>
+                <a:effectLst/>
+                <a:latin typeface="Consolas" panose="020B0609020204030204" pitchFamily="49" charset="0"/>
+              </a:rPr>
+              <a:t>Here</a:t>
+            </a:r>
+          </a:p>
+          <a:p>
+            <a:r>
+              <a:rPr lang="en-US" b="0" dirty="0">
+                <a:solidFill>
+                  <a:schemeClr val="accent1"/>
+                </a:solidFill>
+                <a:effectLst/>
+                <a:latin typeface="Consolas" panose="020B0609020204030204" pitchFamily="49" charset="0"/>
+              </a:rPr>
+              <a:t>alpha = 0.7 </a:t>
+            </a:r>
+            <a:r>
+              <a:rPr lang="en-US" b="0" dirty="0">
+                <a:solidFill>
+                  <a:schemeClr val="bg1">
+                    <a:lumMod val="65000"/>
+                  </a:schemeClr>
+                </a:solidFill>
+                <a:effectLst/>
+                <a:latin typeface="Consolas" panose="020B0609020204030204" pitchFamily="49" charset="0"/>
+              </a:rPr>
+              <a:t>video length</a:t>
+            </a:r>
+          </a:p>
+          <a:p>
+            <a:r>
+              <a:rPr lang="en-US" b="0" dirty="0">
+                <a:solidFill>
+                  <a:schemeClr val="accent1"/>
+                </a:solidFill>
+                <a:effectLst/>
+                <a:latin typeface="Consolas" panose="020B0609020204030204" pitchFamily="49" charset="0"/>
+              </a:rPr>
+              <a:t>beta = 0.1  </a:t>
+            </a:r>
+            <a:r>
+              <a:rPr lang="en-US" b="0" dirty="0">
+                <a:solidFill>
+                  <a:schemeClr val="bg1">
+                    <a:lumMod val="65000"/>
+                  </a:schemeClr>
+                </a:solidFill>
+                <a:effectLst/>
+                <a:latin typeface="Consolas" panose="020B0609020204030204" pitchFamily="49" charset="0"/>
+              </a:rPr>
+              <a:t>video popularity</a:t>
+            </a:r>
+          </a:p>
+          <a:p>
+            <a:r>
+              <a:rPr lang="en-US" b="0" dirty="0">
+                <a:solidFill>
+                  <a:schemeClr val="accent1"/>
+                </a:solidFill>
+                <a:effectLst/>
+                <a:latin typeface="Consolas" panose="020B0609020204030204" pitchFamily="49" charset="0"/>
+              </a:rPr>
+              <a:t>gamma = 0.</a:t>
+            </a:r>
+            <a:r>
+              <a:rPr lang="en-US" dirty="0">
+                <a:solidFill>
+                  <a:schemeClr val="accent1"/>
+                </a:solidFill>
+                <a:latin typeface="Consolas" panose="020B0609020204030204" pitchFamily="49" charset="0"/>
+              </a:rPr>
+              <a:t>1</a:t>
+            </a:r>
+            <a:r>
+              <a:rPr lang="en-US" b="0" dirty="0">
+                <a:solidFill>
+                  <a:schemeClr val="accent1"/>
+                </a:solidFill>
+                <a:effectLst/>
+                <a:latin typeface="Consolas" panose="020B0609020204030204" pitchFamily="49" charset="0"/>
+              </a:rPr>
+              <a:t> </a:t>
+            </a:r>
+            <a:r>
+              <a:rPr lang="en-US" b="0" dirty="0">
+                <a:solidFill>
+                  <a:schemeClr val="bg1">
+                    <a:lumMod val="65000"/>
+                  </a:schemeClr>
+                </a:solidFill>
+                <a:effectLst/>
+                <a:latin typeface="Consolas" panose="020B0609020204030204" pitchFamily="49" charset="0"/>
+              </a:rPr>
+              <a:t>video alignment </a:t>
+            </a:r>
+            <a:r>
+              <a:rPr lang="en-US" b="0" dirty="0">
+                <a:solidFill>
+                  <a:schemeClr val="accent1"/>
+                </a:solidFill>
+                <a:effectLst/>
+                <a:latin typeface="Consolas" panose="020B0609020204030204" pitchFamily="49" charset="0"/>
+              </a:rPr>
+              <a:t>delta = 0.1 </a:t>
+            </a:r>
+            <a:r>
+              <a:rPr lang="en-US" b="0" dirty="0">
+                <a:solidFill>
+                  <a:schemeClr val="bg1">
+                    <a:lumMod val="65000"/>
+                  </a:schemeClr>
+                </a:solidFill>
+                <a:effectLst/>
+                <a:latin typeface="Consolas" panose="020B0609020204030204" pitchFamily="49" charset="0"/>
+              </a:rPr>
+              <a:t>video extremeness</a:t>
+            </a:r>
+          </a:p>
+        </p:txBody>
+      </p:sp>
+      <p:sp>
+        <p:nvSpPr>
+          <p:cNvPr id="8" name="TextBox 7">
+            <a:extLst>
+              <a:ext uri="{FF2B5EF4-FFF2-40B4-BE49-F238E27FC236}">
+                <a16:creationId xmlns:a16="http://schemas.microsoft.com/office/drawing/2014/main" id="{218101C3-8FED-AB0C-AF2F-895F1344421A}"/>
+              </a:ext>
+            </a:extLst>
+          </p:cNvPr>
+          <p:cNvSpPr txBox="1"/>
+          <p:nvPr/>
+        </p:nvSpPr>
+        <p:spPr>
+          <a:xfrm>
+            <a:off x="692469" y="2638916"/>
+            <a:ext cx="3857364" cy="1200329"/>
+          </a:xfrm>
+          <a:prstGeom prst="rect">
+            <a:avLst/>
+          </a:prstGeom>
+          <a:noFill/>
+        </p:spPr>
+        <p:txBody>
+          <a:bodyPr wrap="square">
+            <a:spAutoFit/>
+          </a:bodyPr>
+          <a:lstStyle/>
+          <a:p>
+            <a:r>
+              <a:rPr lang="en-US" b="0" dirty="0">
+                <a:solidFill>
+                  <a:schemeClr val="accent1">
+                    <a:lumMod val="50000"/>
+                  </a:schemeClr>
+                </a:solidFill>
+                <a:effectLst/>
+                <a:latin typeface="Consolas" panose="020B0609020204030204" pitchFamily="49" charset="0"/>
+              </a:rPr>
+              <a:t>However, the amount of minutes watched gets closer (no scoring = avg of 108.98, scoring = avg of 103.12).</a:t>
+            </a:r>
+            <a:endParaRPr lang="en-US" b="0" dirty="0">
+              <a:solidFill>
+                <a:schemeClr val="bg1">
+                  <a:lumMod val="65000"/>
+                </a:schemeClr>
+              </a:solidFill>
+              <a:effectLst/>
+              <a:latin typeface="Consolas" panose="020B0609020204030204" pitchFamily="49" charset="0"/>
+            </a:endParaRPr>
+          </a:p>
+        </p:txBody>
+      </p:sp>
+      <p:pic>
+        <p:nvPicPr>
+          <p:cNvPr id="4" name="Picture 3">
+            <a:extLst>
+              <a:ext uri="{FF2B5EF4-FFF2-40B4-BE49-F238E27FC236}">
+                <a16:creationId xmlns:a16="http://schemas.microsoft.com/office/drawing/2014/main" id="{F1A4AD11-7B1D-A1C6-A760-9B4A3AD7C3E3}"/>
+              </a:ext>
+            </a:extLst>
+          </p:cNvPr>
+          <p:cNvPicPr>
+            <a:picLocks noChangeAspect="1"/>
+          </p:cNvPicPr>
+          <p:nvPr/>
+        </p:nvPicPr>
+        <p:blipFill>
+          <a:blip r:embed="rId2"/>
+          <a:stretch>
+            <a:fillRect/>
+          </a:stretch>
+        </p:blipFill>
+        <p:spPr>
+          <a:xfrm>
+            <a:off x="5843328" y="1591695"/>
+            <a:ext cx="5581650" cy="4191000"/>
+          </a:xfrm>
+          <a:prstGeom prst="rect">
+            <a:avLst/>
+          </a:prstGeom>
+        </p:spPr>
+      </p:pic>
+    </p:spTree>
+    <p:extLst>
+      <p:ext uri="{BB962C8B-B14F-4D97-AF65-F5344CB8AC3E}">
+        <p14:creationId xmlns:p14="http://schemas.microsoft.com/office/powerpoint/2010/main" val="2890997479"/>
+      </p:ext>
+    </p:extLst>
+  </p:cSld>
+  <p:clrMapOvr>
+    <a:masterClrMapping/>
+  </p:clrMapOvr>
+</p:sld>
+</file>
+
+<file path=ppt/slides/slide37.xml><?xml version="1.0" encoding="utf-8"?>
+<p:sld xmlns:a="http://schemas.openxmlformats.org/drawingml/2006/main" xmlns:r="http://schemas.openxmlformats.org/officeDocument/2006/relationships" xmlns:p="http://schemas.openxmlformats.org/presentationml/2006/main">
+  <p:cSld>
+    <p:spTree>
+      <p:nvGrpSpPr>
+        <p:cNvPr id="1" name="">
+          <a:extLst>
+            <a:ext uri="{FF2B5EF4-FFF2-40B4-BE49-F238E27FC236}">
+              <a16:creationId xmlns:a16="http://schemas.microsoft.com/office/drawing/2014/main" id="{932A4BD1-B412-E0B8-C869-D0F68BC576D6}"/>
+            </a:ext>
+          </a:extLst>
+        </p:cNvPr>
+        <p:cNvGrpSpPr/>
+        <p:nvPr/>
+      </p:nvGrpSpPr>
+      <p:grpSpPr>
+        <a:xfrm>
+          <a:off x="0" y="0"/>
+          <a:ext cx="0" cy="0"/>
+          <a:chOff x="0" y="0"/>
+          <a:chExt cx="0" cy="0"/>
+        </a:xfrm>
+      </p:grpSpPr>
+      <p:sp>
+        <p:nvSpPr>
+          <p:cNvPr id="2" name="Title 1">
+            <a:extLst>
+              <a:ext uri="{FF2B5EF4-FFF2-40B4-BE49-F238E27FC236}">
+                <a16:creationId xmlns:a16="http://schemas.microsoft.com/office/drawing/2014/main" id="{D0F05779-0D46-AFE7-F55C-6642F42223C3}"/>
+              </a:ext>
+            </a:extLst>
+          </p:cNvPr>
+          <p:cNvSpPr>
+            <a:spLocks noGrp="1"/>
+          </p:cNvSpPr>
+          <p:nvPr>
+            <p:ph type="title"/>
+          </p:nvPr>
+        </p:nvSpPr>
+        <p:spPr>
+          <a:xfrm>
+            <a:off x="590723" y="-66503"/>
+            <a:ext cx="10772775" cy="1658198"/>
+          </a:xfrm>
+        </p:spPr>
+        <p:txBody>
+          <a:bodyPr/>
+          <a:lstStyle/>
+          <a:p>
+            <a:r>
+              <a:rPr lang="en-US" dirty="0"/>
+              <a:t>Expanding on the Last Slide</a:t>
+            </a:r>
+            <a:br>
+              <a:rPr lang="en-US" dirty="0"/>
+            </a:br>
+            <a:r>
+              <a:rPr lang="en-US" sz="2000" i="1" dirty="0"/>
+              <a:t>What if we really bump the influence of video length?</a:t>
+            </a:r>
+            <a:endParaRPr lang="en-US" dirty="0"/>
+          </a:p>
+        </p:txBody>
+      </p:sp>
+      <p:sp>
+        <p:nvSpPr>
+          <p:cNvPr id="6" name="TextBox 5">
+            <a:extLst>
+              <a:ext uri="{FF2B5EF4-FFF2-40B4-BE49-F238E27FC236}">
+                <a16:creationId xmlns:a16="http://schemas.microsoft.com/office/drawing/2014/main" id="{FDA6D166-5FC1-1C0B-F2B2-90FF79984772}"/>
+              </a:ext>
+            </a:extLst>
+          </p:cNvPr>
+          <p:cNvSpPr txBox="1"/>
+          <p:nvPr/>
+        </p:nvSpPr>
+        <p:spPr>
+          <a:xfrm>
+            <a:off x="226956" y="4886467"/>
+            <a:ext cx="3995909" cy="1477328"/>
+          </a:xfrm>
+          <a:prstGeom prst="rect">
+            <a:avLst/>
+          </a:prstGeom>
+          <a:noFill/>
+        </p:spPr>
+        <p:txBody>
+          <a:bodyPr wrap="square">
+            <a:spAutoFit/>
+          </a:bodyPr>
+          <a:lstStyle/>
+          <a:p>
+            <a:r>
+              <a:rPr lang="en-US" b="0" dirty="0">
+                <a:solidFill>
+                  <a:schemeClr val="accent1">
+                    <a:lumMod val="50000"/>
+                  </a:schemeClr>
+                </a:solidFill>
+                <a:effectLst/>
+                <a:latin typeface="Consolas" panose="020B0609020204030204" pitchFamily="49" charset="0"/>
+              </a:rPr>
+              <a:t>Here</a:t>
+            </a:r>
+          </a:p>
+          <a:p>
+            <a:r>
+              <a:rPr lang="en-US" b="0" dirty="0">
+                <a:solidFill>
+                  <a:schemeClr val="accent1"/>
+                </a:solidFill>
+                <a:effectLst/>
+                <a:latin typeface="Consolas" panose="020B0609020204030204" pitchFamily="49" charset="0"/>
+              </a:rPr>
+              <a:t>alpha = 0.7 </a:t>
+            </a:r>
+            <a:r>
+              <a:rPr lang="en-US" b="0" dirty="0">
+                <a:solidFill>
+                  <a:schemeClr val="bg1">
+                    <a:lumMod val="65000"/>
+                  </a:schemeClr>
+                </a:solidFill>
+                <a:effectLst/>
+                <a:latin typeface="Consolas" panose="020B0609020204030204" pitchFamily="49" charset="0"/>
+              </a:rPr>
+              <a:t>video length</a:t>
+            </a:r>
+          </a:p>
+          <a:p>
+            <a:r>
+              <a:rPr lang="en-US" b="0" dirty="0">
+                <a:solidFill>
+                  <a:schemeClr val="accent1"/>
+                </a:solidFill>
+                <a:effectLst/>
+                <a:latin typeface="Consolas" panose="020B0609020204030204" pitchFamily="49" charset="0"/>
+              </a:rPr>
+              <a:t>beta = 0.1  </a:t>
+            </a:r>
+            <a:r>
+              <a:rPr lang="en-US" b="0" dirty="0">
+                <a:solidFill>
+                  <a:schemeClr val="bg1">
+                    <a:lumMod val="65000"/>
+                  </a:schemeClr>
+                </a:solidFill>
+                <a:effectLst/>
+                <a:latin typeface="Consolas" panose="020B0609020204030204" pitchFamily="49" charset="0"/>
+              </a:rPr>
+              <a:t>video popularity</a:t>
+            </a:r>
+          </a:p>
+          <a:p>
+            <a:r>
+              <a:rPr lang="en-US" b="0" dirty="0">
+                <a:solidFill>
+                  <a:schemeClr val="accent1"/>
+                </a:solidFill>
+                <a:effectLst/>
+                <a:latin typeface="Consolas" panose="020B0609020204030204" pitchFamily="49" charset="0"/>
+              </a:rPr>
+              <a:t>gamma = 0.</a:t>
+            </a:r>
+            <a:r>
+              <a:rPr lang="en-US" dirty="0">
+                <a:solidFill>
+                  <a:schemeClr val="accent1"/>
+                </a:solidFill>
+                <a:latin typeface="Consolas" panose="020B0609020204030204" pitchFamily="49" charset="0"/>
+              </a:rPr>
+              <a:t>1</a:t>
+            </a:r>
+            <a:r>
+              <a:rPr lang="en-US" b="0" dirty="0">
+                <a:solidFill>
+                  <a:schemeClr val="accent1"/>
+                </a:solidFill>
+                <a:effectLst/>
+                <a:latin typeface="Consolas" panose="020B0609020204030204" pitchFamily="49" charset="0"/>
+              </a:rPr>
+              <a:t> </a:t>
+            </a:r>
+            <a:r>
+              <a:rPr lang="en-US" b="0" dirty="0">
+                <a:solidFill>
+                  <a:schemeClr val="bg1">
+                    <a:lumMod val="65000"/>
+                  </a:schemeClr>
+                </a:solidFill>
+                <a:effectLst/>
+                <a:latin typeface="Consolas" panose="020B0609020204030204" pitchFamily="49" charset="0"/>
+              </a:rPr>
+              <a:t>video alignment </a:t>
+            </a:r>
+            <a:r>
+              <a:rPr lang="en-US" b="0" dirty="0">
+                <a:solidFill>
+                  <a:schemeClr val="accent1"/>
+                </a:solidFill>
+                <a:effectLst/>
+                <a:latin typeface="Consolas" panose="020B0609020204030204" pitchFamily="49" charset="0"/>
+              </a:rPr>
+              <a:t>delta = 0.1 </a:t>
+            </a:r>
+            <a:r>
+              <a:rPr lang="en-US" b="0" dirty="0">
+                <a:solidFill>
+                  <a:schemeClr val="bg1">
+                    <a:lumMod val="65000"/>
+                  </a:schemeClr>
+                </a:solidFill>
+                <a:effectLst/>
+                <a:latin typeface="Consolas" panose="020B0609020204030204" pitchFamily="49" charset="0"/>
+              </a:rPr>
+              <a:t>video extremeness</a:t>
+            </a:r>
+          </a:p>
+        </p:txBody>
+      </p:sp>
+      <p:sp>
+        <p:nvSpPr>
+          <p:cNvPr id="8" name="TextBox 7">
+            <a:extLst>
+              <a:ext uri="{FF2B5EF4-FFF2-40B4-BE49-F238E27FC236}">
+                <a16:creationId xmlns:a16="http://schemas.microsoft.com/office/drawing/2014/main" id="{D22CDBB7-515B-A0BB-2087-3395625FC138}"/>
+              </a:ext>
+            </a:extLst>
+          </p:cNvPr>
+          <p:cNvSpPr txBox="1"/>
+          <p:nvPr/>
+        </p:nvSpPr>
+        <p:spPr>
+          <a:xfrm>
+            <a:off x="692469" y="2638916"/>
+            <a:ext cx="3857364" cy="1477328"/>
+          </a:xfrm>
+          <a:prstGeom prst="rect">
+            <a:avLst/>
+          </a:prstGeom>
+          <a:noFill/>
+        </p:spPr>
+        <p:txBody>
+          <a:bodyPr wrap="square">
+            <a:spAutoFit/>
+          </a:bodyPr>
+          <a:lstStyle/>
+          <a:p>
+            <a:r>
+              <a:rPr lang="en-US" b="0" dirty="0">
+                <a:solidFill>
+                  <a:schemeClr val="accent1">
+                    <a:lumMod val="50000"/>
+                  </a:schemeClr>
+                </a:solidFill>
+                <a:effectLst/>
+                <a:latin typeface="Consolas" panose="020B0609020204030204" pitchFamily="49" charset="0"/>
+              </a:rPr>
+              <a:t>The # of videos watched still stays nearly the same, but get a LITTLE closer (4.23 videos watched with scoring vs. 2.8 watched without).</a:t>
+            </a:r>
+            <a:endParaRPr lang="en-US" b="0" dirty="0">
+              <a:solidFill>
+                <a:schemeClr val="bg1">
+                  <a:lumMod val="65000"/>
+                </a:schemeClr>
+              </a:solidFill>
+              <a:effectLst/>
+              <a:latin typeface="Consolas" panose="020B0609020204030204" pitchFamily="49" charset="0"/>
+            </a:endParaRPr>
+          </a:p>
+        </p:txBody>
+      </p:sp>
+      <p:pic>
+        <p:nvPicPr>
+          <p:cNvPr id="9" name="Picture 8">
+            <a:extLst>
+              <a:ext uri="{FF2B5EF4-FFF2-40B4-BE49-F238E27FC236}">
+                <a16:creationId xmlns:a16="http://schemas.microsoft.com/office/drawing/2014/main" id="{36F19200-EDD4-3048-A14B-A3F8FEC72924}"/>
+              </a:ext>
+            </a:extLst>
+          </p:cNvPr>
+          <p:cNvPicPr>
+            <a:picLocks noChangeAspect="1"/>
+          </p:cNvPicPr>
+          <p:nvPr/>
+        </p:nvPicPr>
+        <p:blipFill>
+          <a:blip r:embed="rId2"/>
+          <a:stretch>
+            <a:fillRect/>
+          </a:stretch>
+        </p:blipFill>
+        <p:spPr>
+          <a:xfrm>
+            <a:off x="6203631" y="1333500"/>
+            <a:ext cx="5295900" cy="4191000"/>
+          </a:xfrm>
+          <a:prstGeom prst="rect">
+            <a:avLst/>
+          </a:prstGeom>
+        </p:spPr>
+      </p:pic>
+    </p:spTree>
+    <p:extLst>
+      <p:ext uri="{BB962C8B-B14F-4D97-AF65-F5344CB8AC3E}">
+        <p14:creationId xmlns:p14="http://schemas.microsoft.com/office/powerpoint/2010/main" val="329414049"/>
+      </p:ext>
+    </p:extLst>
+  </p:cSld>
+  <p:clrMapOvr>
+    <a:masterClrMapping/>
+  </p:clrMapOvr>
+</p:sld>
+</file>
+
+<file path=ppt/slides/slide38.xml><?xml version="1.0" encoding="utf-8"?>
+<p:sld xmlns:a="http://schemas.openxmlformats.org/drawingml/2006/main" xmlns:r="http://schemas.openxmlformats.org/officeDocument/2006/relationships" xmlns:p="http://schemas.openxmlformats.org/presentationml/2006/main">
+  <p:cSld>
+    <p:spTree>
+      <p:nvGrpSpPr>
+        <p:cNvPr id="1" name=""/>
+        <p:cNvGrpSpPr/>
+        <p:nvPr/>
+      </p:nvGrpSpPr>
+      <p:grpSpPr>
+        <a:xfrm>
+          <a:off x="0" y="0"/>
+          <a:ext cx="0" cy="0"/>
+          <a:chOff x="0" y="0"/>
+          <a:chExt cx="0" cy="0"/>
+        </a:xfrm>
+      </p:grpSpPr>
+      <p:pic>
+        <p:nvPicPr>
+          <p:cNvPr id="6" name="Picture 5">
+            <a:extLst>
+              <a:ext uri="{FF2B5EF4-FFF2-40B4-BE49-F238E27FC236}">
+                <a16:creationId xmlns:a16="http://schemas.microsoft.com/office/drawing/2014/main" id="{6B6FD004-4960-0C22-BDB8-3A5C848AEA51}"/>
+              </a:ext>
+            </a:extLst>
+          </p:cNvPr>
+          <p:cNvPicPr>
+            <a:picLocks noChangeAspect="1"/>
+          </p:cNvPicPr>
+          <p:nvPr/>
+        </p:nvPicPr>
+        <p:blipFill>
+          <a:blip r:embed="rId2"/>
+          <a:stretch>
+            <a:fillRect/>
+          </a:stretch>
+        </p:blipFill>
+        <p:spPr>
+          <a:xfrm>
+            <a:off x="4976553" y="1364868"/>
+            <a:ext cx="7215447" cy="4450472"/>
+          </a:xfrm>
+          <a:prstGeom prst="rect">
+            <a:avLst/>
+          </a:prstGeom>
+        </p:spPr>
+      </p:pic>
+      <p:sp>
+        <p:nvSpPr>
+          <p:cNvPr id="2" name="Title 1">
+            <a:extLst>
+              <a:ext uri="{FF2B5EF4-FFF2-40B4-BE49-F238E27FC236}">
+                <a16:creationId xmlns:a16="http://schemas.microsoft.com/office/drawing/2014/main" id="{DB0B7A56-6109-E9E1-3FFB-B75ACE8E6BDF}"/>
+              </a:ext>
+            </a:extLst>
+          </p:cNvPr>
+          <p:cNvSpPr>
+            <a:spLocks noGrp="1"/>
+          </p:cNvSpPr>
+          <p:nvPr>
+            <p:ph type="title"/>
+          </p:nvPr>
+        </p:nvSpPr>
+        <p:spPr/>
+        <p:txBody>
+          <a:bodyPr/>
+          <a:lstStyle/>
+          <a:p>
+            <a:r>
+              <a:rPr lang="en-US" dirty="0"/>
+              <a:t>Oh, Dear</a:t>
+            </a:r>
+          </a:p>
+        </p:txBody>
+      </p:sp>
+      <p:sp>
+        <p:nvSpPr>
+          <p:cNvPr id="3" name="Content Placeholder 2">
+            <a:extLst>
+              <a:ext uri="{FF2B5EF4-FFF2-40B4-BE49-F238E27FC236}">
+                <a16:creationId xmlns:a16="http://schemas.microsoft.com/office/drawing/2014/main" id="{6338FDD5-8CC7-9BF7-A655-FC0DF0AF4A8D}"/>
+              </a:ext>
+            </a:extLst>
+          </p:cNvPr>
+          <p:cNvSpPr>
+            <a:spLocks noGrp="1"/>
+          </p:cNvSpPr>
+          <p:nvPr>
+            <p:ph sz="half" idx="1"/>
+          </p:nvPr>
+        </p:nvSpPr>
+        <p:spPr>
+          <a:xfrm>
+            <a:off x="122475" y="1970425"/>
+            <a:ext cx="5136710" cy="3767328"/>
+          </a:xfrm>
+        </p:spPr>
+        <p:txBody>
+          <a:bodyPr>
+            <a:normAutofit fontScale="77500" lnSpcReduction="20000"/>
+          </a:bodyPr>
+          <a:lstStyle/>
+          <a:p>
+            <a:pPr>
+              <a:buFont typeface="Arial" panose="020B0604020202020204" pitchFamily="34" charset="0"/>
+              <a:buChar char="•"/>
+            </a:pPr>
+            <a:r>
+              <a:rPr lang="en-US" b="1" dirty="0">
+                <a:solidFill>
+                  <a:schemeClr val="bg1">
+                    <a:lumMod val="65000"/>
+                  </a:schemeClr>
+                </a:solidFill>
+                <a:effectLst/>
+                <a:latin typeface="Consolas" panose="020B0609020204030204" pitchFamily="49" charset="0"/>
+              </a:rPr>
+              <a:t>Todo: Make sure delta rewards being at the extremes, not close to 1</a:t>
+            </a:r>
+          </a:p>
+          <a:p>
+            <a:pPr marL="0" indent="0">
+              <a:buNone/>
+            </a:pPr>
+            <a:endParaRPr lang="en-US" dirty="0"/>
+          </a:p>
+          <a:p>
+            <a:r>
+              <a:rPr lang="en-US" b="0" dirty="0">
+                <a:solidFill>
+                  <a:schemeClr val="tx1"/>
+                </a:solidFill>
+                <a:effectLst/>
+                <a:latin typeface="Consolas" panose="020B0609020204030204" pitchFamily="49" charset="0"/>
+              </a:rPr>
+              <a:t>if((</a:t>
+            </a:r>
+            <a:r>
+              <a:rPr lang="en-US" b="0" dirty="0" err="1">
+                <a:solidFill>
+                  <a:schemeClr val="tx1"/>
+                </a:solidFill>
+                <a:effectLst/>
+                <a:latin typeface="Consolas" panose="020B0609020204030204" pitchFamily="49" charset="0"/>
+              </a:rPr>
+              <a:t>ev</a:t>
+            </a:r>
+            <a:r>
+              <a:rPr lang="en-US" b="0" dirty="0">
+                <a:solidFill>
+                  <a:schemeClr val="tx1"/>
+                </a:solidFill>
+                <a:effectLst/>
+                <a:latin typeface="Consolas" panose="020B0609020204030204" pitchFamily="49" charset="0"/>
+              </a:rPr>
+              <a:t> &lt;= 0.2) or (</a:t>
+            </a:r>
+            <a:r>
+              <a:rPr lang="en-US" b="0" dirty="0" err="1">
+                <a:solidFill>
+                  <a:schemeClr val="tx1"/>
+                </a:solidFill>
+                <a:effectLst/>
+                <a:latin typeface="Consolas" panose="020B0609020204030204" pitchFamily="49" charset="0"/>
+              </a:rPr>
+              <a:t>ev</a:t>
+            </a:r>
+            <a:r>
+              <a:rPr lang="en-US" b="0" dirty="0">
+                <a:solidFill>
+                  <a:schemeClr val="tx1"/>
+                </a:solidFill>
+                <a:effectLst/>
+                <a:latin typeface="Consolas" panose="020B0609020204030204" pitchFamily="49" charset="0"/>
+              </a:rPr>
+              <a:t> &gt;= 0.8)):</a:t>
+            </a:r>
+          </a:p>
+          <a:p>
+            <a:r>
+              <a:rPr lang="en-US" b="0" dirty="0">
+                <a:solidFill>
+                  <a:schemeClr val="tx1"/>
+                </a:solidFill>
+                <a:effectLst/>
+                <a:latin typeface="Consolas" panose="020B0609020204030204" pitchFamily="49" charset="0"/>
+              </a:rPr>
+              <a:t>   </a:t>
+            </a:r>
+            <a:r>
+              <a:rPr lang="en-US" b="0" dirty="0" err="1">
+                <a:solidFill>
+                  <a:schemeClr val="tx1"/>
+                </a:solidFill>
+                <a:effectLst/>
+                <a:latin typeface="Consolas" panose="020B0609020204030204" pitchFamily="49" charset="0"/>
+              </a:rPr>
+              <a:t>e_return</a:t>
+            </a:r>
+            <a:r>
+              <a:rPr lang="en-US" b="0" dirty="0">
+                <a:solidFill>
+                  <a:schemeClr val="tx1"/>
+                </a:solidFill>
+                <a:effectLst/>
+                <a:latin typeface="Consolas" panose="020B0609020204030204" pitchFamily="49" charset="0"/>
+              </a:rPr>
+              <a:t> = </a:t>
+            </a:r>
+            <a:r>
+              <a:rPr lang="en-US" b="1" dirty="0">
+                <a:solidFill>
+                  <a:schemeClr val="tx1"/>
+                </a:solidFill>
+                <a:effectLst/>
+                <a:latin typeface="Consolas" panose="020B0609020204030204" pitchFamily="49" charset="0"/>
+              </a:rPr>
+              <a:t>1</a:t>
+            </a:r>
+          </a:p>
+          <a:p>
+            <a:r>
+              <a:rPr lang="en-US" b="0" dirty="0">
+                <a:solidFill>
+                  <a:schemeClr val="tx1"/>
+                </a:solidFill>
+                <a:effectLst/>
+                <a:latin typeface="Consolas" panose="020B0609020204030204" pitchFamily="49" charset="0"/>
+              </a:rPr>
+              <a:t>else:</a:t>
+            </a:r>
+          </a:p>
+          <a:p>
+            <a:r>
+              <a:rPr lang="en-US" b="0" dirty="0">
+                <a:solidFill>
+                  <a:schemeClr val="tx1"/>
+                </a:solidFill>
+                <a:effectLst/>
+                <a:latin typeface="Consolas" panose="020B0609020204030204" pitchFamily="49" charset="0"/>
+              </a:rPr>
+              <a:t>   </a:t>
+            </a:r>
+            <a:r>
+              <a:rPr lang="en-US" b="0" dirty="0" err="1">
+                <a:solidFill>
+                  <a:schemeClr val="tx1"/>
+                </a:solidFill>
+                <a:effectLst/>
+                <a:latin typeface="Consolas" panose="020B0609020204030204" pitchFamily="49" charset="0"/>
+              </a:rPr>
+              <a:t>e_return</a:t>
+            </a:r>
+            <a:r>
+              <a:rPr lang="en-US" b="0" dirty="0">
+                <a:solidFill>
+                  <a:schemeClr val="tx1"/>
+                </a:solidFill>
+                <a:effectLst/>
+                <a:latin typeface="Consolas" panose="020B0609020204030204" pitchFamily="49" charset="0"/>
+              </a:rPr>
+              <a:t> = 0</a:t>
+            </a:r>
+          </a:p>
+          <a:p>
+            <a:endParaRPr lang="en-US" b="0" dirty="0">
+              <a:solidFill>
+                <a:schemeClr val="tx1"/>
+              </a:solidFill>
+              <a:effectLst/>
+              <a:latin typeface="Consolas" panose="020B0609020204030204" pitchFamily="49" charset="0"/>
+            </a:endParaRPr>
+          </a:p>
+          <a:p>
+            <a:r>
+              <a:rPr lang="en-US" b="0" dirty="0">
+                <a:solidFill>
+                  <a:schemeClr val="tx1"/>
+                </a:solidFill>
+                <a:effectLst/>
+                <a:latin typeface="Consolas" panose="020B0609020204030204" pitchFamily="49" charset="0"/>
+              </a:rPr>
+              <a:t>Make delta the value that’s getting manipulated, not </a:t>
+            </a:r>
+            <a:r>
+              <a:rPr lang="en-US" b="0" dirty="0" err="1">
+                <a:solidFill>
+                  <a:schemeClr val="tx1"/>
+                </a:solidFill>
+                <a:effectLst/>
+                <a:latin typeface="Consolas" panose="020B0609020204030204" pitchFamily="49" charset="0"/>
+              </a:rPr>
+              <a:t>e_return</a:t>
+            </a:r>
+            <a:endParaRPr lang="en-US" b="0" dirty="0">
+              <a:solidFill>
+                <a:schemeClr val="tx1"/>
+              </a:solidFill>
+              <a:effectLst/>
+              <a:latin typeface="Consolas" panose="020B0609020204030204" pitchFamily="49" charset="0"/>
+            </a:endParaRPr>
+          </a:p>
+          <a:p>
+            <a:r>
+              <a:rPr lang="en-US" dirty="0"/>
+              <a:t>Make 0.2 and 0.8 parameters/vars that you can change, not hardcoded</a:t>
+            </a:r>
+          </a:p>
+        </p:txBody>
+      </p:sp>
+    </p:spTree>
+    <p:extLst>
+      <p:ext uri="{BB962C8B-B14F-4D97-AF65-F5344CB8AC3E}">
+        <p14:creationId xmlns:p14="http://schemas.microsoft.com/office/powerpoint/2010/main" val="2201002433"/>
+      </p:ext>
+    </p:extLst>
+  </p:cSld>
+  <p:clrMapOvr>
+    <a:masterClrMapping/>
+  </p:clrMapOvr>
+</p:sld>
+</file>
+
+<file path=ppt/slides/slide39.xml><?xml version="1.0" encoding="utf-8"?>
+<p:sld xmlns:a="http://schemas.openxmlformats.org/drawingml/2006/main" xmlns:r="http://schemas.openxmlformats.org/officeDocument/2006/relationships" xmlns:p="http://schemas.openxmlformats.org/presentationml/2006/main">
+  <p:cSld>
+    <p:spTree>
+      <p:nvGrpSpPr>
+        <p:cNvPr id="1" name="">
+          <a:extLst>
+            <a:ext uri="{FF2B5EF4-FFF2-40B4-BE49-F238E27FC236}">
+              <a16:creationId xmlns:a16="http://schemas.microsoft.com/office/drawing/2014/main" id="{561F0419-713F-0B58-0F28-97398A171497}"/>
+            </a:ext>
+          </a:extLst>
+        </p:cNvPr>
+        <p:cNvGrpSpPr/>
+        <p:nvPr/>
+      </p:nvGrpSpPr>
+      <p:grpSpPr>
+        <a:xfrm>
+          <a:off x="0" y="0"/>
+          <a:ext cx="0" cy="0"/>
+          <a:chOff x="0" y="0"/>
+          <a:chExt cx="0" cy="0"/>
+        </a:xfrm>
+      </p:grpSpPr>
+      <p:sp>
+        <p:nvSpPr>
+          <p:cNvPr id="2" name="Title 1">
+            <a:extLst>
+              <a:ext uri="{FF2B5EF4-FFF2-40B4-BE49-F238E27FC236}">
+                <a16:creationId xmlns:a16="http://schemas.microsoft.com/office/drawing/2014/main" id="{E13F3430-62BC-8EC0-4714-992FAF2817E6}"/>
+              </a:ext>
+            </a:extLst>
+          </p:cNvPr>
+          <p:cNvSpPr>
+            <a:spLocks noGrp="1"/>
+          </p:cNvSpPr>
+          <p:nvPr>
+            <p:ph type="title"/>
+          </p:nvPr>
+        </p:nvSpPr>
+        <p:spPr/>
+        <p:txBody>
+          <a:bodyPr/>
+          <a:lstStyle/>
+          <a:p>
+            <a:r>
+              <a:rPr lang="en-US" dirty="0"/>
+              <a:t>Oh, Dear</a:t>
+            </a:r>
+          </a:p>
+        </p:txBody>
+      </p:sp>
+      <p:sp>
+        <p:nvSpPr>
+          <p:cNvPr id="3" name="Content Placeholder 2">
+            <a:extLst>
+              <a:ext uri="{FF2B5EF4-FFF2-40B4-BE49-F238E27FC236}">
+                <a16:creationId xmlns:a16="http://schemas.microsoft.com/office/drawing/2014/main" id="{B1D9AC0A-B31A-1B61-136A-526A347D6EEB}"/>
+              </a:ext>
+            </a:extLst>
+          </p:cNvPr>
+          <p:cNvSpPr>
+            <a:spLocks noGrp="1"/>
+          </p:cNvSpPr>
+          <p:nvPr>
+            <p:ph sz="half" idx="1"/>
+          </p:nvPr>
+        </p:nvSpPr>
+        <p:spPr>
+          <a:xfrm>
+            <a:off x="122475" y="1970425"/>
+            <a:ext cx="5136710" cy="3067088"/>
+          </a:xfrm>
+        </p:spPr>
+        <p:txBody>
+          <a:bodyPr>
+            <a:normAutofit fontScale="85000" lnSpcReduction="20000"/>
+          </a:bodyPr>
+          <a:lstStyle/>
+          <a:p>
+            <a:pPr>
+              <a:buFont typeface="Arial" panose="020B0604020202020204" pitchFamily="34" charset="0"/>
+              <a:buChar char="•"/>
+            </a:pPr>
+            <a:r>
+              <a:rPr lang="en-US" b="1" dirty="0">
+                <a:solidFill>
+                  <a:schemeClr val="bg1">
+                    <a:lumMod val="65000"/>
+                  </a:schemeClr>
+                </a:solidFill>
+                <a:effectLst/>
+                <a:latin typeface="Consolas" panose="020B0609020204030204" pitchFamily="49" charset="0"/>
+              </a:rPr>
+              <a:t>Todo: Make sure delta rewards being at the extremes, not close to 1</a:t>
+            </a:r>
+          </a:p>
+          <a:p>
+            <a:pPr marL="0" indent="0">
+              <a:buNone/>
+            </a:pPr>
+            <a:endParaRPr lang="en-US" dirty="0"/>
+          </a:p>
+          <a:p>
+            <a:r>
+              <a:rPr lang="en-US" b="0" dirty="0">
+                <a:solidFill>
+                  <a:schemeClr val="tx1"/>
+                </a:solidFill>
+                <a:effectLst/>
+                <a:latin typeface="Consolas" panose="020B0609020204030204" pitchFamily="49" charset="0"/>
+              </a:rPr>
+              <a:t>if((</a:t>
+            </a:r>
+            <a:r>
+              <a:rPr lang="en-US" b="0" dirty="0" err="1">
+                <a:solidFill>
+                  <a:schemeClr val="tx1"/>
+                </a:solidFill>
+                <a:effectLst/>
+                <a:latin typeface="Consolas" panose="020B0609020204030204" pitchFamily="49" charset="0"/>
+              </a:rPr>
+              <a:t>ev</a:t>
+            </a:r>
+            <a:r>
+              <a:rPr lang="en-US" b="0" dirty="0">
+                <a:solidFill>
+                  <a:schemeClr val="tx1"/>
+                </a:solidFill>
+                <a:effectLst/>
+                <a:latin typeface="Consolas" panose="020B0609020204030204" pitchFamily="49" charset="0"/>
+              </a:rPr>
+              <a:t> &lt;= 0.2) or (</a:t>
+            </a:r>
+            <a:r>
+              <a:rPr lang="en-US" b="0" dirty="0" err="1">
+                <a:solidFill>
+                  <a:schemeClr val="tx1"/>
+                </a:solidFill>
+                <a:effectLst/>
+                <a:latin typeface="Consolas" panose="020B0609020204030204" pitchFamily="49" charset="0"/>
+              </a:rPr>
+              <a:t>ev</a:t>
+            </a:r>
+            <a:r>
+              <a:rPr lang="en-US" b="0" dirty="0">
+                <a:solidFill>
+                  <a:schemeClr val="tx1"/>
+                </a:solidFill>
+                <a:effectLst/>
+                <a:latin typeface="Consolas" panose="020B0609020204030204" pitchFamily="49" charset="0"/>
+              </a:rPr>
+              <a:t> &gt;= 0.8)):</a:t>
+            </a:r>
+          </a:p>
+          <a:p>
+            <a:r>
+              <a:rPr lang="en-US" b="0" dirty="0">
+                <a:solidFill>
+                  <a:schemeClr val="tx1"/>
+                </a:solidFill>
+                <a:effectLst/>
+                <a:latin typeface="Consolas" panose="020B0609020204030204" pitchFamily="49" charset="0"/>
+              </a:rPr>
+              <a:t>   </a:t>
+            </a:r>
+            <a:r>
+              <a:rPr lang="en-US" b="0" dirty="0" err="1">
+                <a:solidFill>
+                  <a:schemeClr val="tx1"/>
+                </a:solidFill>
+                <a:effectLst/>
+                <a:latin typeface="Consolas" panose="020B0609020204030204" pitchFamily="49" charset="0"/>
+              </a:rPr>
+              <a:t>e_return</a:t>
+            </a:r>
+            <a:r>
+              <a:rPr lang="en-US" b="0" dirty="0">
+                <a:solidFill>
+                  <a:schemeClr val="tx1"/>
+                </a:solidFill>
+                <a:effectLst/>
+                <a:latin typeface="Consolas" panose="020B0609020204030204" pitchFamily="49" charset="0"/>
+              </a:rPr>
+              <a:t> = </a:t>
+            </a:r>
+            <a:r>
+              <a:rPr lang="en-US" b="1" dirty="0">
+                <a:solidFill>
+                  <a:schemeClr val="tx1"/>
+                </a:solidFill>
+                <a:effectLst/>
+                <a:latin typeface="Consolas" panose="020B0609020204030204" pitchFamily="49" charset="0"/>
+              </a:rPr>
+              <a:t>0.5</a:t>
+            </a:r>
+          </a:p>
+          <a:p>
+            <a:r>
+              <a:rPr lang="en-US" b="0" dirty="0">
+                <a:solidFill>
+                  <a:schemeClr val="tx1"/>
+                </a:solidFill>
+                <a:effectLst/>
+                <a:latin typeface="Consolas" panose="020B0609020204030204" pitchFamily="49" charset="0"/>
+              </a:rPr>
+              <a:t>else:</a:t>
+            </a:r>
+          </a:p>
+          <a:p>
+            <a:r>
+              <a:rPr lang="en-US" b="0" dirty="0">
+                <a:solidFill>
+                  <a:schemeClr val="tx1"/>
+                </a:solidFill>
+                <a:effectLst/>
+                <a:latin typeface="Consolas" panose="020B0609020204030204" pitchFamily="49" charset="0"/>
+              </a:rPr>
+              <a:t>   </a:t>
+            </a:r>
+            <a:r>
+              <a:rPr lang="en-US" b="0" dirty="0" err="1">
+                <a:solidFill>
+                  <a:schemeClr val="tx1"/>
+                </a:solidFill>
+                <a:effectLst/>
+                <a:latin typeface="Consolas" panose="020B0609020204030204" pitchFamily="49" charset="0"/>
+              </a:rPr>
+              <a:t>e_return</a:t>
+            </a:r>
+            <a:r>
+              <a:rPr lang="en-US" b="0" dirty="0">
+                <a:solidFill>
+                  <a:schemeClr val="tx1"/>
+                </a:solidFill>
+                <a:effectLst/>
+                <a:latin typeface="Consolas" panose="020B0609020204030204" pitchFamily="49" charset="0"/>
+              </a:rPr>
+              <a:t> = 0</a:t>
+            </a:r>
+          </a:p>
+          <a:p>
+            <a:br>
+              <a:rPr lang="en-US" b="0" dirty="0">
+                <a:solidFill>
+                  <a:srgbClr val="F8F8F2"/>
+                </a:solidFill>
+                <a:effectLst/>
+                <a:latin typeface="Consolas" panose="020B0609020204030204" pitchFamily="49" charset="0"/>
+              </a:rPr>
+            </a:br>
+            <a:endParaRPr lang="en-US" b="0" dirty="0">
+              <a:solidFill>
+                <a:srgbClr val="F8F8F2"/>
+              </a:solidFill>
+              <a:effectLst/>
+              <a:latin typeface="Consolas" panose="020B0609020204030204" pitchFamily="49" charset="0"/>
+            </a:endParaRPr>
+          </a:p>
+          <a:p>
+            <a:pPr marL="0" indent="0">
+              <a:buNone/>
+            </a:pPr>
+            <a:endParaRPr lang="en-US" dirty="0"/>
+          </a:p>
+        </p:txBody>
+      </p:sp>
+      <p:pic>
+        <p:nvPicPr>
+          <p:cNvPr id="5" name="Picture 4">
+            <a:extLst>
+              <a:ext uri="{FF2B5EF4-FFF2-40B4-BE49-F238E27FC236}">
+                <a16:creationId xmlns:a16="http://schemas.microsoft.com/office/drawing/2014/main" id="{FE7E8831-5030-D96A-5251-7F86A425C652}"/>
+              </a:ext>
+            </a:extLst>
+          </p:cNvPr>
+          <p:cNvPicPr>
+            <a:picLocks noChangeAspect="1"/>
+          </p:cNvPicPr>
+          <p:nvPr/>
+        </p:nvPicPr>
+        <p:blipFill>
+          <a:blip r:embed="rId2"/>
+          <a:stretch>
+            <a:fillRect/>
+          </a:stretch>
+        </p:blipFill>
+        <p:spPr>
+          <a:xfrm>
+            <a:off x="4883207" y="1328632"/>
+            <a:ext cx="7258050" cy="4476750"/>
+          </a:xfrm>
+          <a:prstGeom prst="rect">
+            <a:avLst/>
+          </a:prstGeom>
+        </p:spPr>
+      </p:pic>
+    </p:spTree>
+    <p:extLst>
+      <p:ext uri="{BB962C8B-B14F-4D97-AF65-F5344CB8AC3E}">
+        <p14:creationId xmlns:p14="http://schemas.microsoft.com/office/powerpoint/2010/main" val="4128699030"/>
+      </p:ext>
+    </p:extLst>
+  </p:cSld>
+  <p:clrMapOvr>
+    <a:masterClrMapping/>
+  </p:clrMapOvr>
+</p:sld>
+</file>
+
 <file path=ppt/slides/slide4.xml><?xml version="1.0" encoding="utf-8"?>
 <p:sld xmlns:a="http://schemas.openxmlformats.org/drawingml/2006/main" xmlns:r="http://schemas.openxmlformats.org/officeDocument/2006/relationships" xmlns:p="http://schemas.openxmlformats.org/presentationml/2006/main">
   <p:cSld>
@@ -15780,6 +19305,417 @@
     <p:extLst>
       <p:ext uri="{BB962C8B-B14F-4D97-AF65-F5344CB8AC3E}">
         <p14:creationId xmlns:p14="http://schemas.microsoft.com/office/powerpoint/2010/main" val="791931765"/>
+      </p:ext>
+    </p:extLst>
+  </p:cSld>
+  <p:clrMapOvr>
+    <a:masterClrMapping/>
+  </p:clrMapOvr>
+</p:sld>
+</file>
+
+<file path=ppt/slides/slide40.xml><?xml version="1.0" encoding="utf-8"?>
+<p:sld xmlns:a="http://schemas.openxmlformats.org/drawingml/2006/main" xmlns:r="http://schemas.openxmlformats.org/officeDocument/2006/relationships" xmlns:p="http://schemas.openxmlformats.org/presentationml/2006/main">
+  <p:cSld>
+    <p:spTree>
+      <p:nvGrpSpPr>
+        <p:cNvPr id="1" name=""/>
+        <p:cNvGrpSpPr/>
+        <p:nvPr/>
+      </p:nvGrpSpPr>
+      <p:grpSpPr>
+        <a:xfrm>
+          <a:off x="0" y="0"/>
+          <a:ext cx="0" cy="0"/>
+          <a:chOff x="0" y="0"/>
+          <a:chExt cx="0" cy="0"/>
+        </a:xfrm>
+      </p:grpSpPr>
+      <p:sp>
+        <p:nvSpPr>
+          <p:cNvPr id="2" name="Title 1">
+            <a:extLst>
+              <a:ext uri="{FF2B5EF4-FFF2-40B4-BE49-F238E27FC236}">
+                <a16:creationId xmlns:a16="http://schemas.microsoft.com/office/drawing/2014/main" id="{4DD3A894-302A-9F84-8E94-B781E88177E1}"/>
+              </a:ext>
+            </a:extLst>
+          </p:cNvPr>
+          <p:cNvSpPr>
+            <a:spLocks noGrp="1"/>
+          </p:cNvSpPr>
+          <p:nvPr>
+            <p:ph type="title"/>
+          </p:nvPr>
+        </p:nvSpPr>
+        <p:spPr/>
+        <p:txBody>
+          <a:bodyPr>
+            <a:normAutofit fontScale="90000"/>
+          </a:bodyPr>
+          <a:lstStyle/>
+          <a:p>
+            <a:r>
+              <a:rPr lang="en-US" sz="2400" dirty="0"/>
+              <a:t>Left = no change, Right = rewarding extremes</a:t>
+            </a:r>
+            <a:br>
+              <a:rPr lang="en-US" sz="2400" dirty="0"/>
+            </a:br>
+            <a:r>
+              <a:rPr lang="en-US" sz="2400" dirty="0" err="1"/>
+              <a:t>todo</a:t>
+            </a:r>
+            <a:r>
+              <a:rPr lang="en-US" sz="2400" dirty="0"/>
+              <a:t>:</a:t>
+            </a:r>
+            <a:br>
+              <a:rPr lang="en-US" sz="2400" dirty="0"/>
+            </a:br>
+            <a:r>
+              <a:rPr lang="en-US" sz="2400" dirty="0"/>
+              <a:t>in the </a:t>
+            </a:r>
+            <a:r>
+              <a:rPr lang="en-US" sz="2400" dirty="0" err="1"/>
+              <a:t>rightgraph</a:t>
+            </a:r>
+            <a:r>
+              <a:rPr lang="en-US" sz="2400" dirty="0"/>
+              <a:t>, dark </a:t>
+            </a:r>
+            <a:r>
+              <a:rPr lang="en-US" sz="2400" dirty="0" err="1"/>
+              <a:t>bulue</a:t>
+            </a:r>
+            <a:r>
+              <a:rPr lang="en-US" sz="2400" dirty="0"/>
+              <a:t> line, delta = 0. see what happens when you change delta. Do the same for all parameters</a:t>
+            </a:r>
+            <a:br>
+              <a:rPr lang="en-US" sz="2400" dirty="0"/>
+            </a:br>
+            <a:r>
+              <a:rPr lang="en-US" sz="2400" dirty="0"/>
+              <a:t>send by Friday a list </a:t>
+            </a:r>
+            <a:r>
+              <a:rPr lang="en-US" sz="2400" dirty="0" err="1"/>
+              <a:t>fo</a:t>
+            </a:r>
+            <a:r>
+              <a:rPr lang="en-US" sz="2400" dirty="0"/>
+              <a:t> three more questions you can answer with a numerical experiment</a:t>
+            </a:r>
+            <a:br>
+              <a:rPr lang="en-US" sz="2400" dirty="0"/>
+            </a:br>
+            <a:r>
+              <a:rPr lang="en-US" sz="2400" dirty="0"/>
+              <a:t>1. Is it possible to reduce the emphasis on extremeness but keep total minutes watched approximately the same?</a:t>
+            </a:r>
+            <a:br>
+              <a:rPr lang="en-US" sz="2400" dirty="0"/>
+            </a:br>
+            <a:r>
+              <a:rPr lang="en-US" sz="2400" dirty="0"/>
+              <a:t>	Reduce emphasis on extremeness = change delta. Can these other weights be changed in order to reduce delta, </a:t>
+            </a:r>
+            <a:r>
+              <a:rPr lang="en-US" sz="2400" dirty="0" err="1"/>
+              <a:t>ut</a:t>
+            </a:r>
+            <a:r>
+              <a:rPr lang="en-US" sz="2400" dirty="0"/>
+              <a:t> keep people watching lots of videos?</a:t>
+            </a:r>
+            <a:br>
+              <a:rPr lang="en-US" sz="2400" dirty="0"/>
+            </a:br>
+            <a:endParaRPr lang="en-US" sz="2400" dirty="0"/>
+          </a:p>
+        </p:txBody>
+      </p:sp>
+      <p:pic>
+        <p:nvPicPr>
+          <p:cNvPr id="4" name="Picture 3">
+            <a:extLst>
+              <a:ext uri="{FF2B5EF4-FFF2-40B4-BE49-F238E27FC236}">
+                <a16:creationId xmlns:a16="http://schemas.microsoft.com/office/drawing/2014/main" id="{8F88D23E-5682-E6F1-EEB2-920B56A72CDC}"/>
+              </a:ext>
+            </a:extLst>
+          </p:cNvPr>
+          <p:cNvPicPr>
+            <a:picLocks noChangeAspect="1"/>
+          </p:cNvPicPr>
+          <p:nvPr/>
+        </p:nvPicPr>
+        <p:blipFill>
+          <a:blip r:embed="rId2"/>
+          <a:stretch>
+            <a:fillRect/>
+          </a:stretch>
+        </p:blipFill>
+        <p:spPr>
+          <a:xfrm>
+            <a:off x="335193" y="2436321"/>
+            <a:ext cx="5857875" cy="4191000"/>
+          </a:xfrm>
+          <a:prstGeom prst="rect">
+            <a:avLst/>
+          </a:prstGeom>
+        </p:spPr>
+      </p:pic>
+      <p:pic>
+        <p:nvPicPr>
+          <p:cNvPr id="8" name="Picture 7">
+            <a:extLst>
+              <a:ext uri="{FF2B5EF4-FFF2-40B4-BE49-F238E27FC236}">
+                <a16:creationId xmlns:a16="http://schemas.microsoft.com/office/drawing/2014/main" id="{AC818C9E-D4FA-93E3-63A9-FDA04962EC94}"/>
+              </a:ext>
+            </a:extLst>
+          </p:cNvPr>
+          <p:cNvPicPr>
+            <a:picLocks noChangeAspect="1"/>
+          </p:cNvPicPr>
+          <p:nvPr/>
+        </p:nvPicPr>
+        <p:blipFill>
+          <a:blip r:embed="rId3"/>
+          <a:stretch>
+            <a:fillRect/>
+          </a:stretch>
+        </p:blipFill>
+        <p:spPr>
+          <a:xfrm>
+            <a:off x="6279939" y="2436321"/>
+            <a:ext cx="5857875" cy="4191000"/>
+          </a:xfrm>
+          <a:prstGeom prst="rect">
+            <a:avLst/>
+          </a:prstGeom>
+        </p:spPr>
+      </p:pic>
+      <p:sp>
+        <p:nvSpPr>
+          <p:cNvPr id="7" name="Rectangle 6">
+            <a:extLst>
+              <a:ext uri="{FF2B5EF4-FFF2-40B4-BE49-F238E27FC236}">
+                <a16:creationId xmlns:a16="http://schemas.microsoft.com/office/drawing/2014/main" id="{E1C7F090-9999-2DD1-F1C1-8DF47E7640FA}"/>
+              </a:ext>
+            </a:extLst>
+          </p:cNvPr>
+          <p:cNvSpPr/>
+          <p:nvPr/>
+        </p:nvSpPr>
+        <p:spPr>
+          <a:xfrm>
+            <a:off x="6403385" y="2804159"/>
+            <a:ext cx="443532" cy="393468"/>
+          </a:xfrm>
+          <a:prstGeom prst="rect">
+            <a:avLst/>
+          </a:prstGeom>
+          <a:solidFill>
+            <a:schemeClr val="accent1">
+              <a:alpha val="34000"/>
+            </a:schemeClr>
+          </a:solidFill>
+          <a:ln>
+            <a:noFill/>
+          </a:ln>
+        </p:spPr>
+        <p:style>
+          <a:lnRef idx="2">
+            <a:schemeClr val="accent1">
+              <a:shade val="15000"/>
+            </a:schemeClr>
+          </a:lnRef>
+          <a:fillRef idx="1">
+            <a:schemeClr val="accent1"/>
+          </a:fillRef>
+          <a:effectRef idx="0">
+            <a:schemeClr val="accent1"/>
+          </a:effectRef>
+          <a:fontRef idx="minor">
+            <a:schemeClr val="lt1"/>
+          </a:fontRef>
+        </p:style>
+        <p:txBody>
+          <a:bodyPr rtlCol="0" anchor="ctr"/>
+          <a:lstStyle/>
+          <a:p>
+            <a:pPr algn="ctr"/>
+            <a:endParaRPr lang="en-US"/>
+          </a:p>
+        </p:txBody>
+      </p:sp>
+      <p:sp>
+        <p:nvSpPr>
+          <p:cNvPr id="9" name="Rectangle 8">
+            <a:extLst>
+              <a:ext uri="{FF2B5EF4-FFF2-40B4-BE49-F238E27FC236}">
+                <a16:creationId xmlns:a16="http://schemas.microsoft.com/office/drawing/2014/main" id="{8D38A9BE-0E97-1C9C-4786-57024FC88227}"/>
+              </a:ext>
+            </a:extLst>
+          </p:cNvPr>
+          <p:cNvSpPr/>
+          <p:nvPr/>
+        </p:nvSpPr>
+        <p:spPr>
+          <a:xfrm>
+            <a:off x="481952" y="2895599"/>
+            <a:ext cx="443532" cy="393468"/>
+          </a:xfrm>
+          <a:prstGeom prst="rect">
+            <a:avLst/>
+          </a:prstGeom>
+          <a:solidFill>
+            <a:schemeClr val="accent1">
+              <a:alpha val="34000"/>
+            </a:schemeClr>
+          </a:solidFill>
+          <a:ln>
+            <a:noFill/>
+          </a:ln>
+        </p:spPr>
+        <p:style>
+          <a:lnRef idx="2">
+            <a:schemeClr val="accent1">
+              <a:shade val="15000"/>
+            </a:schemeClr>
+          </a:lnRef>
+          <a:fillRef idx="1">
+            <a:schemeClr val="accent1"/>
+          </a:fillRef>
+          <a:effectRef idx="0">
+            <a:schemeClr val="accent1"/>
+          </a:effectRef>
+          <a:fontRef idx="minor">
+            <a:schemeClr val="lt1"/>
+          </a:fontRef>
+        </p:style>
+        <p:txBody>
+          <a:bodyPr rtlCol="0" anchor="ctr"/>
+          <a:lstStyle/>
+          <a:p>
+            <a:pPr algn="ctr"/>
+            <a:endParaRPr lang="en-US"/>
+          </a:p>
+        </p:txBody>
+      </p:sp>
+      <p:sp>
+        <p:nvSpPr>
+          <p:cNvPr id="10" name="Rectangle 9">
+            <a:extLst>
+              <a:ext uri="{FF2B5EF4-FFF2-40B4-BE49-F238E27FC236}">
+                <a16:creationId xmlns:a16="http://schemas.microsoft.com/office/drawing/2014/main" id="{395FCF47-8291-6254-3B38-53094EF7E041}"/>
+              </a:ext>
+            </a:extLst>
+          </p:cNvPr>
+          <p:cNvSpPr/>
+          <p:nvPr/>
+        </p:nvSpPr>
+        <p:spPr>
+          <a:xfrm>
+            <a:off x="6403385" y="5964999"/>
+            <a:ext cx="443532" cy="393468"/>
+          </a:xfrm>
+          <a:prstGeom prst="rect">
+            <a:avLst/>
+          </a:prstGeom>
+          <a:solidFill>
+            <a:schemeClr val="accent1">
+              <a:alpha val="34000"/>
+            </a:schemeClr>
+          </a:solidFill>
+          <a:ln>
+            <a:noFill/>
+          </a:ln>
+        </p:spPr>
+        <p:style>
+          <a:lnRef idx="2">
+            <a:schemeClr val="accent1">
+              <a:shade val="15000"/>
+            </a:schemeClr>
+          </a:lnRef>
+          <a:fillRef idx="1">
+            <a:schemeClr val="accent1"/>
+          </a:fillRef>
+          <a:effectRef idx="0">
+            <a:schemeClr val="accent1"/>
+          </a:effectRef>
+          <a:fontRef idx="minor">
+            <a:schemeClr val="lt1"/>
+          </a:fontRef>
+        </p:style>
+        <p:txBody>
+          <a:bodyPr rtlCol="0" anchor="ctr"/>
+          <a:lstStyle/>
+          <a:p>
+            <a:pPr algn="ctr"/>
+            <a:endParaRPr lang="en-US"/>
+          </a:p>
+        </p:txBody>
+      </p:sp>
+      <p:sp>
+        <p:nvSpPr>
+          <p:cNvPr id="11" name="Rectangle 10">
+            <a:extLst>
+              <a:ext uri="{FF2B5EF4-FFF2-40B4-BE49-F238E27FC236}">
+                <a16:creationId xmlns:a16="http://schemas.microsoft.com/office/drawing/2014/main" id="{7B1C2E3B-B183-E305-D49C-CEDE50C2C9A3}"/>
+              </a:ext>
+            </a:extLst>
+          </p:cNvPr>
+          <p:cNvSpPr/>
+          <p:nvPr/>
+        </p:nvSpPr>
+        <p:spPr>
+          <a:xfrm>
+            <a:off x="481952" y="5904807"/>
+            <a:ext cx="443532" cy="393468"/>
+          </a:xfrm>
+          <a:prstGeom prst="rect">
+            <a:avLst/>
+          </a:prstGeom>
+          <a:solidFill>
+            <a:schemeClr val="accent1">
+              <a:alpha val="34000"/>
+            </a:schemeClr>
+          </a:solidFill>
+          <a:ln>
+            <a:noFill/>
+          </a:ln>
+        </p:spPr>
+        <p:style>
+          <a:lnRef idx="2">
+            <a:schemeClr val="accent1">
+              <a:shade val="15000"/>
+            </a:schemeClr>
+          </a:lnRef>
+          <a:fillRef idx="1">
+            <a:schemeClr val="accent1"/>
+          </a:fillRef>
+          <a:effectRef idx="0">
+            <a:schemeClr val="accent1"/>
+          </a:effectRef>
+          <a:fontRef idx="minor">
+            <a:schemeClr val="lt1"/>
+          </a:fontRef>
+        </p:style>
+        <p:txBody>
+          <a:bodyPr rtlCol="0" anchor="ctr"/>
+          <a:lstStyle/>
+          <a:p>
+            <a:pPr algn="ctr"/>
+            <a:endParaRPr lang="en-US"/>
+          </a:p>
+        </p:txBody>
+      </p:sp>
+    </p:spTree>
+    <p:extLst>
+      <p:ext uri="{BB962C8B-B14F-4D97-AF65-F5344CB8AC3E}">
+        <p14:creationId xmlns:p14="http://schemas.microsoft.com/office/powerpoint/2010/main" val="3765844276"/>
       </p:ext>
     </p:extLst>
   </p:cSld>

</xml_diff>